<commit_message>
This commit includes the upload of the powerpoint presentation.
</commit_message>
<xml_diff>
--- a/Global Cuisine Recipe Project.pptx
+++ b/Global Cuisine Recipe Project.pptx
@@ -23,23 +23,24 @@
     <p:sldId id="268" r:id="rId18"/>
     <p:sldId id="269" r:id="rId19"/>
     <p:sldId id="270" r:id="rId20"/>
+    <p:sldId id="271" r:id="rId21"/>
   </p:sldIdLst>
   <p:sldSz cy="5143500" cx="9144000"/>
   <p:notesSz cx="6858000" cy="9144000"/>
   <p:embeddedFontLst>
     <p:embeddedFont>
       <p:font typeface="Raleway"/>
-      <p:regular r:id="rId21"/>
-      <p:bold r:id="rId22"/>
-      <p:italic r:id="rId23"/>
-      <p:boldItalic r:id="rId24"/>
+      <p:regular r:id="rId22"/>
+      <p:bold r:id="rId23"/>
+      <p:italic r:id="rId24"/>
+      <p:boldItalic r:id="rId25"/>
     </p:embeddedFont>
     <p:embeddedFont>
       <p:font typeface="Lato"/>
-      <p:regular r:id="rId25"/>
-      <p:bold r:id="rId26"/>
-      <p:italic r:id="rId27"/>
-      <p:boldItalic r:id="rId28"/>
+      <p:regular r:id="rId26"/>
+      <p:bold r:id="rId27"/>
+      <p:italic r:id="rId28"/>
+      <p:boldItalic r:id="rId29"/>
     </p:embeddedFont>
   </p:embeddedFontLst>
   <p:defaultTextStyle>
@@ -820,7 +821,7 @@
   <p:cSld>
     <p:spTree>
       <p:nvGrpSpPr>
-        <p:cNvPr id="145" name="Shape 145"/>
+        <p:cNvPr id="143" name="Shape 143"/>
         <p:cNvGrpSpPr/>
         <p:nvPr/>
       </p:nvGrpSpPr>
@@ -834,7 +835,7 @@
       </p:grpSpPr>
       <p:sp>
         <p:nvSpPr>
-          <p:cNvPr id="146" name="Google Shape;146;g746261ca0b_0_139:notes"/>
+          <p:cNvPr id="144" name="Google Shape;144;g746261ca0b_0_92:notes"/>
           <p:cNvSpPr/>
           <p:nvPr>
             <p:ph idx="2" type="sldImg"/>
@@ -869,7 +870,7 @@
       </p:sp>
       <p:sp>
         <p:nvSpPr>
-          <p:cNvPr id="147" name="Google Shape;147;g746261ca0b_0_139:notes"/>
+          <p:cNvPr id="145" name="Google Shape;145;g746261ca0b_0_92:notes"/>
           <p:cNvSpPr txBox="1"/>
           <p:nvPr>
             <p:ph idx="1" type="body"/>
@@ -933,7 +934,7 @@
       </p:grpSpPr>
       <p:sp>
         <p:nvSpPr>
-          <p:cNvPr id="152" name="Google Shape;152;g746261ca0b_0_144:notes"/>
+          <p:cNvPr id="152" name="Google Shape;152;g746261ca0b_0_139:notes"/>
           <p:cNvSpPr/>
           <p:nvPr>
             <p:ph idx="2" type="sldImg"/>
@@ -968,7 +969,7 @@
       </p:sp>
       <p:sp>
         <p:nvSpPr>
-          <p:cNvPr id="153" name="Google Shape;153;g746261ca0b_0_144:notes"/>
+          <p:cNvPr id="153" name="Google Shape;153;g746261ca0b_0_139:notes"/>
           <p:cNvSpPr txBox="1"/>
           <p:nvPr>
             <p:ph idx="1" type="body"/>
@@ -1018,7 +1019,7 @@
   <p:cSld>
     <p:spTree>
       <p:nvGrpSpPr>
-        <p:cNvPr id="160" name="Shape 160"/>
+        <p:cNvPr id="157" name="Shape 157"/>
         <p:cNvGrpSpPr/>
         <p:nvPr/>
       </p:nvGrpSpPr>
@@ -1032,7 +1033,7 @@
       </p:grpSpPr>
       <p:sp>
         <p:nvSpPr>
-          <p:cNvPr id="161" name="Google Shape;161;g746261ca0b_0_116:notes"/>
+          <p:cNvPr id="158" name="Google Shape;158;g746261ca0b_0_144:notes"/>
           <p:cNvSpPr/>
           <p:nvPr>
             <p:ph idx="2" type="sldImg"/>
@@ -1067,7 +1068,7 @@
       </p:sp>
       <p:sp>
         <p:nvSpPr>
-          <p:cNvPr id="162" name="Google Shape;162;g746261ca0b_0_116:notes"/>
+          <p:cNvPr id="159" name="Google Shape;159;g746261ca0b_0_144:notes"/>
           <p:cNvSpPr txBox="1"/>
           <p:nvPr>
             <p:ph idx="1" type="body"/>
@@ -1117,7 +1118,7 @@
   <p:cSld>
     <p:spTree>
       <p:nvGrpSpPr>
-        <p:cNvPr id="167" name="Shape 167"/>
+        <p:cNvPr id="166" name="Shape 166"/>
         <p:cNvGrpSpPr/>
         <p:nvPr/>
       </p:nvGrpSpPr>
@@ -1131,7 +1132,7 @@
       </p:grpSpPr>
       <p:sp>
         <p:nvSpPr>
-          <p:cNvPr id="168" name="Google Shape;168;g746261ca0b_0_149:notes"/>
+          <p:cNvPr id="167" name="Google Shape;167;g746261ca0b_0_116:notes"/>
           <p:cNvSpPr/>
           <p:nvPr>
             <p:ph idx="2" type="sldImg"/>
@@ -1166,7 +1167,7 @@
       </p:sp>
       <p:sp>
         <p:nvSpPr>
-          <p:cNvPr id="169" name="Google Shape;169;g746261ca0b_0_149:notes"/>
+          <p:cNvPr id="168" name="Google Shape;168;g746261ca0b_0_116:notes"/>
           <p:cNvSpPr txBox="1"/>
           <p:nvPr>
             <p:ph idx="1" type="body"/>
@@ -1216,7 +1217,7 @@
   <p:cSld>
     <p:spTree>
       <p:nvGrpSpPr>
-        <p:cNvPr id="174" name="Shape 174"/>
+        <p:cNvPr id="173" name="Shape 173"/>
         <p:cNvGrpSpPr/>
         <p:nvPr/>
       </p:nvGrpSpPr>
@@ -1230,7 +1231,7 @@
       </p:grpSpPr>
       <p:sp>
         <p:nvSpPr>
-          <p:cNvPr id="175" name="Google Shape;175;g746261ca0b_0_155:notes"/>
+          <p:cNvPr id="174" name="Google Shape;174;g746261ca0b_0_149:notes"/>
           <p:cNvSpPr/>
           <p:nvPr>
             <p:ph idx="2" type="sldImg"/>
@@ -1265,7 +1266,7 @@
       </p:sp>
       <p:sp>
         <p:nvSpPr>
-          <p:cNvPr id="176" name="Google Shape;176;g746261ca0b_0_155:notes"/>
+          <p:cNvPr id="175" name="Google Shape;175;g746261ca0b_0_149:notes"/>
           <p:cNvSpPr txBox="1"/>
           <p:nvPr>
             <p:ph idx="1" type="body"/>
@@ -1329,7 +1330,7 @@
       </p:grpSpPr>
       <p:sp>
         <p:nvSpPr>
-          <p:cNvPr id="181" name="Google Shape;181;g746261ca0b_0_128:notes"/>
+          <p:cNvPr id="181" name="Google Shape;181;g746261ca0b_0_155:notes"/>
           <p:cNvSpPr/>
           <p:nvPr>
             <p:ph idx="2" type="sldImg"/>
@@ -1364,7 +1365,106 @@
       </p:sp>
       <p:sp>
         <p:nvSpPr>
-          <p:cNvPr id="182" name="Google Shape;182;g746261ca0b_0_128:notes"/>
+          <p:cNvPr id="182" name="Google Shape;182;g746261ca0b_0_155:notes"/>
+          <p:cNvSpPr txBox="1"/>
+          <p:nvPr>
+            <p:ph idx="1" type="body"/>
+          </p:nvPr>
+        </p:nvSpPr>
+        <p:spPr>
+          <a:xfrm>
+            <a:off x="685800" y="4343400"/>
+            <a:ext cx="5486400" cy="4114800"/>
+          </a:xfrm>
+          <a:prstGeom prst="rect">
+            <a:avLst/>
+          </a:prstGeom>
+        </p:spPr>
+        <p:txBody>
+          <a:bodyPr anchorCtr="0" anchor="t" bIns="91425" lIns="91425" spcFirstLastPara="1" rIns="91425" wrap="square" tIns="91425">
+            <a:noAutofit/>
+          </a:bodyPr>
+          <a:lstStyle/>
+          <a:p>
+            <a:pPr indent="0" lvl="0" marL="0" rtl="0" algn="l">
+              <a:spcBef>
+                <a:spcPts val="0"/>
+              </a:spcBef>
+              <a:spcAft>
+                <a:spcPts val="0"/>
+              </a:spcAft>
+              <a:buNone/>
+            </a:pPr>
+            <a:r>
+              <a:t/>
+            </a:r>
+            <a:endParaRPr/>
+          </a:p>
+        </p:txBody>
+      </p:sp>
+    </p:spTree>
+  </p:cSld>
+  <p:clrMapOvr>
+    <a:masterClrMapping/>
+  </p:clrMapOvr>
+</p:notes>
+</file>
+
+<file path=ppt/notesSlides/notesSlide16.xml><?xml version="1.0" encoding="utf-8"?>
+<p:notes xmlns:a="http://schemas.openxmlformats.org/drawingml/2006/main" xmlns:r="http://schemas.openxmlformats.org/officeDocument/2006/relationships" xmlns:mc="http://schemas.openxmlformats.org/markup-compatibility/2006" xmlns:mv="urn:schemas-microsoft-com:mac:vml" xmlns:p="http://schemas.openxmlformats.org/presentationml/2006/main" xmlns:c="http://schemas.openxmlformats.org/drawingml/2006/chart" xmlns:dgm="http://schemas.openxmlformats.org/drawingml/2006/diagram" xmlns:o="urn:schemas-microsoft-com:office:office" xmlns:v="urn:schemas-microsoft-com:vml" xmlns:pvml="urn:schemas-microsoft-com:office:powerpoint" xmlns:com="http://schemas.openxmlformats.org/drawingml/2006/compatibility" xmlns:p14="http://schemas.microsoft.com/office/powerpoint/2010/main" xmlns:p15="http://schemas.microsoft.com/office/powerpoint/2012/main" showMasterPhAnim="0" showMasterSp="0">
+  <p:cSld>
+    <p:spTree>
+      <p:nvGrpSpPr>
+        <p:cNvPr id="186" name="Shape 186"/>
+        <p:cNvGrpSpPr/>
+        <p:nvPr/>
+      </p:nvGrpSpPr>
+      <p:grpSpPr>
+        <a:xfrm>
+          <a:off x="0" y="0"/>
+          <a:ext cx="0" cy="0"/>
+          <a:chOff x="0" y="0"/>
+          <a:chExt cx="0" cy="0"/>
+        </a:xfrm>
+      </p:grpSpPr>
+      <p:sp>
+        <p:nvSpPr>
+          <p:cNvPr id="187" name="Google Shape;187;g746261ca0b_0_128:notes"/>
+          <p:cNvSpPr/>
+          <p:nvPr>
+            <p:ph idx="2" type="sldImg"/>
+          </p:nvPr>
+        </p:nvSpPr>
+        <p:spPr>
+          <a:xfrm>
+            <a:off x="381300" y="685800"/>
+            <a:ext cx="6096000" cy="3429000"/>
+          </a:xfrm>
+          <a:custGeom>
+            <a:rect b="b" l="l" r="r" t="t"/>
+            <a:pathLst>
+              <a:path extrusionOk="0" h="120000" w="120000">
+                <a:moveTo>
+                  <a:pt x="0" y="0"/>
+                </a:moveTo>
+                <a:lnTo>
+                  <a:pt x="120000" y="0"/>
+                </a:lnTo>
+                <a:lnTo>
+                  <a:pt x="120000" y="120000"/>
+                </a:lnTo>
+                <a:lnTo>
+                  <a:pt x="0" y="120000"/>
+                </a:lnTo>
+                <a:close/>
+              </a:path>
+            </a:pathLst>
+          </a:custGeom>
+        </p:spPr>
+      </p:sp>
+      <p:sp>
+        <p:nvSpPr>
+          <p:cNvPr id="188" name="Google Shape;188;g746261ca0b_0_128:notes"/>
           <p:cNvSpPr txBox="1"/>
           <p:nvPr>
             <p:ph idx="1" type="body"/>
@@ -1527,7 +1627,7 @@
       </p:grpSpPr>
       <p:sp>
         <p:nvSpPr>
-          <p:cNvPr id="95" name="Google Shape;95;g746261ca0b_0_82:notes"/>
+          <p:cNvPr id="95" name="Google Shape;95;g87139f3449_0_236:notes"/>
           <p:cNvSpPr/>
           <p:nvPr>
             <p:ph idx="2" type="sldImg"/>
@@ -1562,7 +1662,7 @@
       </p:sp>
       <p:sp>
         <p:nvSpPr>
-          <p:cNvPr id="96" name="Google Shape;96;g746261ca0b_0_82:notes"/>
+          <p:cNvPr id="96" name="Google Shape;96;g87139f3449_0_236:notes"/>
           <p:cNvSpPr txBox="1"/>
           <p:nvPr>
             <p:ph idx="1" type="body"/>
@@ -1626,7 +1726,7 @@
       </p:grpSpPr>
       <p:sp>
         <p:nvSpPr>
-          <p:cNvPr id="101" name="Google Shape;101;g746261ca0b_0_87:notes"/>
+          <p:cNvPr id="101" name="Google Shape;101;g746261ca0b_0_82:notes"/>
           <p:cNvSpPr/>
           <p:nvPr>
             <p:ph idx="2" type="sldImg"/>
@@ -1661,7 +1761,7 @@
       </p:sp>
       <p:sp>
         <p:nvSpPr>
-          <p:cNvPr id="102" name="Google Shape;102;g746261ca0b_0_87:notes"/>
+          <p:cNvPr id="102" name="Google Shape;102;g746261ca0b_0_82:notes"/>
           <p:cNvSpPr txBox="1"/>
           <p:nvPr>
             <p:ph idx="1" type="body"/>
@@ -1711,7 +1811,7 @@
   <p:cSld>
     <p:spTree>
       <p:nvGrpSpPr>
-        <p:cNvPr id="107" name="Shape 107"/>
+        <p:cNvPr id="106" name="Shape 106"/>
         <p:cNvGrpSpPr/>
         <p:nvPr/>
       </p:nvGrpSpPr>
@@ -1725,7 +1825,7 @@
       </p:grpSpPr>
       <p:sp>
         <p:nvSpPr>
-          <p:cNvPr id="108" name="Google Shape;108;g746261ca0b_0_122:notes"/>
+          <p:cNvPr id="107" name="Google Shape;107;g746261ca0b_0_87:notes"/>
           <p:cNvSpPr/>
           <p:nvPr>
             <p:ph idx="2" type="sldImg"/>
@@ -1760,7 +1860,7 @@
       </p:sp>
       <p:sp>
         <p:nvSpPr>
-          <p:cNvPr id="109" name="Google Shape;109;g746261ca0b_0_122:notes"/>
+          <p:cNvPr id="108" name="Google Shape;108;g746261ca0b_0_87:notes"/>
           <p:cNvSpPr txBox="1"/>
           <p:nvPr>
             <p:ph idx="1" type="body"/>
@@ -1810,7 +1910,7 @@
   <p:cSld>
     <p:spTree>
       <p:nvGrpSpPr>
-        <p:cNvPr id="114" name="Shape 114"/>
+        <p:cNvPr id="113" name="Shape 113"/>
         <p:cNvGrpSpPr/>
         <p:nvPr/>
       </p:nvGrpSpPr>
@@ -1824,7 +1924,7 @@
       </p:grpSpPr>
       <p:sp>
         <p:nvSpPr>
-          <p:cNvPr id="115" name="Google Shape;115;g746261ca0b_0_97:notes"/>
+          <p:cNvPr id="114" name="Google Shape;114;g746261ca0b_0_122:notes"/>
           <p:cNvSpPr/>
           <p:nvPr>
             <p:ph idx="2" type="sldImg"/>
@@ -1859,7 +1959,7 @@
       </p:sp>
       <p:sp>
         <p:nvSpPr>
-          <p:cNvPr id="116" name="Google Shape;116;g746261ca0b_0_97:notes"/>
+          <p:cNvPr id="115" name="Google Shape;115;g746261ca0b_0_122:notes"/>
           <p:cNvSpPr txBox="1"/>
           <p:nvPr>
             <p:ph idx="1" type="body"/>
@@ -1909,7 +2009,7 @@
   <p:cSld>
     <p:spTree>
       <p:nvGrpSpPr>
-        <p:cNvPr id="123" name="Shape 123"/>
+        <p:cNvPr id="120" name="Shape 120"/>
         <p:cNvGrpSpPr/>
         <p:nvPr/>
       </p:nvGrpSpPr>
@@ -1923,7 +2023,7 @@
       </p:grpSpPr>
       <p:sp>
         <p:nvSpPr>
-          <p:cNvPr id="124" name="Google Shape;124;g7476bff69a_0_23:notes"/>
+          <p:cNvPr id="121" name="Google Shape;121;g746261ca0b_0_97:notes"/>
           <p:cNvSpPr/>
           <p:nvPr>
             <p:ph idx="2" type="sldImg"/>
@@ -1958,7 +2058,7 @@
       </p:sp>
       <p:sp>
         <p:nvSpPr>
-          <p:cNvPr id="125" name="Google Shape;125;g7476bff69a_0_23:notes"/>
+          <p:cNvPr id="122" name="Google Shape;122;g746261ca0b_0_97:notes"/>
           <p:cNvSpPr txBox="1"/>
           <p:nvPr>
             <p:ph idx="1" type="body"/>
@@ -2022,7 +2122,7 @@
       </p:grpSpPr>
       <p:sp>
         <p:nvSpPr>
-          <p:cNvPr id="130" name="Google Shape;130;g7476bff69a_0_4:notes"/>
+          <p:cNvPr id="130" name="Google Shape;130;g7476bff69a_0_23:notes"/>
           <p:cNvSpPr/>
           <p:nvPr>
             <p:ph idx="2" type="sldImg"/>
@@ -2057,7 +2157,7 @@
       </p:sp>
       <p:sp>
         <p:nvSpPr>
-          <p:cNvPr id="131" name="Google Shape;131;g7476bff69a_0_4:notes"/>
+          <p:cNvPr id="131" name="Google Shape;131;g7476bff69a_0_23:notes"/>
           <p:cNvSpPr txBox="1"/>
           <p:nvPr>
             <p:ph idx="1" type="body"/>
@@ -2107,7 +2207,7 @@
   <p:cSld>
     <p:spTree>
       <p:nvGrpSpPr>
-        <p:cNvPr id="137" name="Shape 137"/>
+        <p:cNvPr id="135" name="Shape 135"/>
         <p:cNvGrpSpPr/>
         <p:nvPr/>
       </p:nvGrpSpPr>
@@ -2121,7 +2221,7 @@
       </p:grpSpPr>
       <p:sp>
         <p:nvSpPr>
-          <p:cNvPr id="138" name="Google Shape;138;g746261ca0b_0_92:notes"/>
+          <p:cNvPr id="136" name="Google Shape;136;g7476bff69a_0_4:notes"/>
           <p:cNvSpPr/>
           <p:nvPr>
             <p:ph idx="2" type="sldImg"/>
@@ -2156,7 +2256,7 @@
       </p:sp>
       <p:sp>
         <p:nvSpPr>
-          <p:cNvPr id="139" name="Google Shape;139;g746261ca0b_0_92:notes"/>
+          <p:cNvPr id="137" name="Google Shape;137;g7476bff69a_0_4:notes"/>
           <p:cNvSpPr txBox="1"/>
           <p:nvPr>
             <p:ph idx="1" type="body"/>
@@ -8968,7 +9068,7 @@
   <p:cSld>
     <p:spTree>
       <p:nvGrpSpPr>
-        <p:cNvPr id="148" name="Shape 148"/>
+        <p:cNvPr id="146" name="Shape 146"/>
         <p:cNvGrpSpPr/>
         <p:nvPr/>
       </p:nvGrpSpPr>
@@ -8982,7 +9082,7 @@
       </p:grpSpPr>
       <p:sp>
         <p:nvSpPr>
-          <p:cNvPr id="149" name="Google Shape;149;p22"/>
+          <p:cNvPr id="147" name="Google Shape;147;p22"/>
           <p:cNvSpPr txBox="1"/>
           <p:nvPr>
             <p:ph type="title"/>
@@ -8990,8 +9090,8 @@
         </p:nvSpPr>
         <p:spPr>
           <a:xfrm>
-            <a:off x="500850" y="709050"/>
-            <a:ext cx="3452700" cy="535200"/>
+            <a:off x="653250" y="1166250"/>
+            <a:ext cx="7688700" cy="535200"/>
           </a:xfrm>
           <a:prstGeom prst="rect">
             <a:avLst/>
@@ -9014,7 +9114,22 @@
             </a:pPr>
             <a:r>
               <a:rPr lang="en"/>
-              <a:t>Nexus (Fat.jar)</a:t>
+              <a:t>Sonarqube</a:t>
+            </a:r>
+            <a:endParaRPr/>
+          </a:p>
+          <a:p>
+            <a:pPr indent="0" lvl="0" marL="0" rtl="0" algn="l">
+              <a:spcBef>
+                <a:spcPts val="0"/>
+              </a:spcBef>
+              <a:spcAft>
+                <a:spcPts val="0"/>
+              </a:spcAft>
+              <a:buNone/>
+            </a:pPr>
+            <a:r>
+              <a:t/>
             </a:r>
             <a:endParaRPr/>
           </a:p>
@@ -9022,7 +9137,7 @@
       </p:sp>
       <p:pic>
         <p:nvPicPr>
-          <p:cNvPr id="150" name="Google Shape;150;p22"/>
+          <p:cNvPr id="148" name="Google Shape;148;p22"/>
           <p:cNvPicPr preferRelativeResize="0"/>
           <p:nvPr/>
         </p:nvPicPr>
@@ -9036,8 +9151,64 @@
         </p:blipFill>
         <p:spPr>
           <a:xfrm>
-            <a:off x="457200" y="1320450"/>
-            <a:ext cx="8210998" cy="3594451"/>
+            <a:off x="609600" y="1777650"/>
+            <a:ext cx="4303028" cy="3137249"/>
+          </a:xfrm>
+          <a:prstGeom prst="rect">
+            <a:avLst/>
+          </a:prstGeom>
+          <a:noFill/>
+          <a:ln>
+            <a:noFill/>
+          </a:ln>
+        </p:spPr>
+      </p:pic>
+      <p:pic>
+        <p:nvPicPr>
+          <p:cNvPr id="149" name="Google Shape;149;p22"/>
+          <p:cNvPicPr preferRelativeResize="0"/>
+          <p:nvPr/>
+        </p:nvPicPr>
+        <p:blipFill>
+          <a:blip r:embed="rId4">
+            <a:alphaModFix/>
+          </a:blip>
+          <a:stretch>
+            <a:fillRect/>
+          </a:stretch>
+        </p:blipFill>
+        <p:spPr>
+          <a:xfrm>
+            <a:off x="5333850" y="785250"/>
+            <a:ext cx="2483064" cy="2112999"/>
+          </a:xfrm>
+          <a:prstGeom prst="rect">
+            <a:avLst/>
+          </a:prstGeom>
+          <a:noFill/>
+          <a:ln>
+            <a:noFill/>
+          </a:ln>
+        </p:spPr>
+      </p:pic>
+      <p:pic>
+        <p:nvPicPr>
+          <p:cNvPr id="150" name="Google Shape;150;p22"/>
+          <p:cNvPicPr preferRelativeResize="0"/>
+          <p:nvPr/>
+        </p:nvPicPr>
+        <p:blipFill>
+          <a:blip r:embed="rId5">
+            <a:alphaModFix/>
+          </a:blip>
+          <a:stretch>
+            <a:fillRect/>
+          </a:stretch>
+        </p:blipFill>
+        <p:spPr>
+          <a:xfrm>
+            <a:off x="5388751" y="2905501"/>
+            <a:ext cx="2483075" cy="2126649"/>
           </a:xfrm>
           <a:prstGeom prst="rect">
             <a:avLst/>
@@ -9083,6 +9254,99 @@
         </p:nvSpPr>
         <p:spPr>
           <a:xfrm>
+            <a:off x="500850" y="709050"/>
+            <a:ext cx="3452700" cy="535200"/>
+          </a:xfrm>
+          <a:prstGeom prst="rect">
+            <a:avLst/>
+          </a:prstGeom>
+        </p:spPr>
+        <p:txBody>
+          <a:bodyPr anchorCtr="0" anchor="t" bIns="91425" lIns="91425" spcFirstLastPara="1" rIns="91425" wrap="square" tIns="91425">
+            <a:noAutofit/>
+          </a:bodyPr>
+          <a:lstStyle/>
+          <a:p>
+            <a:pPr indent="0" lvl="0" marL="0" rtl="0" algn="l">
+              <a:spcBef>
+                <a:spcPts val="0"/>
+              </a:spcBef>
+              <a:spcAft>
+                <a:spcPts val="0"/>
+              </a:spcAft>
+              <a:buNone/>
+            </a:pPr>
+            <a:r>
+              <a:rPr lang="en"/>
+              <a:t>Nexus (Fat.jar)</a:t>
+            </a:r>
+            <a:endParaRPr/>
+          </a:p>
+        </p:txBody>
+      </p:sp>
+      <p:pic>
+        <p:nvPicPr>
+          <p:cNvPr id="156" name="Google Shape;156;p23"/>
+          <p:cNvPicPr preferRelativeResize="0"/>
+          <p:nvPr/>
+        </p:nvPicPr>
+        <p:blipFill>
+          <a:blip r:embed="rId3">
+            <a:alphaModFix/>
+          </a:blip>
+          <a:stretch>
+            <a:fillRect/>
+          </a:stretch>
+        </p:blipFill>
+        <p:spPr>
+          <a:xfrm>
+            <a:off x="457200" y="1320450"/>
+            <a:ext cx="8210998" cy="3594451"/>
+          </a:xfrm>
+          <a:prstGeom prst="rect">
+            <a:avLst/>
+          </a:prstGeom>
+          <a:noFill/>
+          <a:ln>
+            <a:noFill/>
+          </a:ln>
+        </p:spPr>
+      </p:pic>
+    </p:spTree>
+  </p:cSld>
+  <p:clrMapOvr>
+    <a:masterClrMapping/>
+  </p:clrMapOvr>
+</p:sld>
+</file>
+
+<file path=ppt/slides/slide12.xml><?xml version="1.0" encoding="utf-8"?>
+<p:sld xmlns:a="http://schemas.openxmlformats.org/drawingml/2006/main" xmlns:r="http://schemas.openxmlformats.org/officeDocument/2006/relationships" xmlns:mc="http://schemas.openxmlformats.org/markup-compatibility/2006" xmlns:mv="urn:schemas-microsoft-com:mac:vml" xmlns:p="http://schemas.openxmlformats.org/presentationml/2006/main" xmlns:c="http://schemas.openxmlformats.org/drawingml/2006/chart" xmlns:dgm="http://schemas.openxmlformats.org/drawingml/2006/diagram" xmlns:o="urn:schemas-microsoft-com:office:office" xmlns:v="urn:schemas-microsoft-com:vml" xmlns:pvml="urn:schemas-microsoft-com:office:powerpoint" xmlns:com="http://schemas.openxmlformats.org/drawingml/2006/compatibility" xmlns:p14="http://schemas.microsoft.com/office/powerpoint/2010/main" xmlns:p15="http://schemas.microsoft.com/office/powerpoint/2012/main">
+  <p:cSld>
+    <p:spTree>
+      <p:nvGrpSpPr>
+        <p:cNvPr id="160" name="Shape 160"/>
+        <p:cNvGrpSpPr/>
+        <p:nvPr/>
+      </p:nvGrpSpPr>
+      <p:grpSpPr>
+        <a:xfrm>
+          <a:off x="0" y="0"/>
+          <a:ext cx="0" cy="0"/>
+          <a:chOff x="0" y="0"/>
+          <a:chExt cx="0" cy="0"/>
+        </a:xfrm>
+      </p:grpSpPr>
+      <p:sp>
+        <p:nvSpPr>
+          <p:cNvPr id="161" name="Google Shape;161;p24"/>
+          <p:cNvSpPr txBox="1"/>
+          <p:nvPr>
+            <p:ph type="title"/>
+          </p:nvPr>
+        </p:nvSpPr>
+        <p:spPr>
+          <a:xfrm>
             <a:off x="653250" y="1090050"/>
             <a:ext cx="7688700" cy="535200"/>
           </a:xfrm>
@@ -9115,7 +9379,7 @@
       </p:sp>
       <p:sp>
         <p:nvSpPr>
-          <p:cNvPr id="156" name="Google Shape;156;p23"/>
+          <p:cNvPr id="162" name="Google Shape;162;p24"/>
           <p:cNvSpPr txBox="1"/>
           <p:nvPr/>
         </p:nvSpPr>
@@ -9281,7 +9545,7 @@
       </p:sp>
       <p:pic>
         <p:nvPicPr>
-          <p:cNvPr id="157" name="Google Shape;157;p23"/>
+          <p:cNvPr id="163" name="Google Shape;163;p24"/>
           <p:cNvPicPr preferRelativeResize="0"/>
           <p:nvPr/>
         </p:nvPicPr>
@@ -9309,7 +9573,7 @@
       </p:pic>
       <p:pic>
         <p:nvPicPr>
-          <p:cNvPr id="158" name="Google Shape;158;p23"/>
+          <p:cNvPr id="164" name="Google Shape;164;p24"/>
           <p:cNvPicPr preferRelativeResize="0"/>
           <p:nvPr/>
         </p:nvPicPr>
@@ -9337,7 +9601,7 @@
       </p:pic>
       <p:pic>
         <p:nvPicPr>
-          <p:cNvPr id="159" name="Google Shape;159;p23"/>
+          <p:cNvPr id="165" name="Google Shape;165;p24"/>
           <p:cNvPicPr preferRelativeResize="0"/>
           <p:nvPr/>
         </p:nvPicPr>
@@ -9371,12 +9635,12 @@
 </p:sld>
 </file>
 
-<file path=ppt/slides/slide12.xml><?xml version="1.0" encoding="utf-8"?>
+<file path=ppt/slides/slide13.xml><?xml version="1.0" encoding="utf-8"?>
 <p:sld xmlns:a="http://schemas.openxmlformats.org/drawingml/2006/main" xmlns:r="http://schemas.openxmlformats.org/officeDocument/2006/relationships" xmlns:mc="http://schemas.openxmlformats.org/markup-compatibility/2006" xmlns:mv="urn:schemas-microsoft-com:mac:vml" xmlns:p="http://schemas.openxmlformats.org/presentationml/2006/main" xmlns:c="http://schemas.openxmlformats.org/drawingml/2006/chart" xmlns:dgm="http://schemas.openxmlformats.org/drawingml/2006/diagram" xmlns:o="urn:schemas-microsoft-com:office:office" xmlns:v="urn:schemas-microsoft-com:vml" xmlns:pvml="urn:schemas-microsoft-com:office:powerpoint" xmlns:com="http://schemas.openxmlformats.org/drawingml/2006/compatibility" xmlns:p14="http://schemas.microsoft.com/office/powerpoint/2010/main" xmlns:p15="http://schemas.microsoft.com/office/powerpoint/2012/main">
   <p:cSld>
     <p:spTree>
       <p:nvGrpSpPr>
-        <p:cNvPr id="163" name="Shape 163"/>
+        <p:cNvPr id="169" name="Shape 169"/>
         <p:cNvGrpSpPr/>
         <p:nvPr/>
       </p:nvGrpSpPr>
@@ -9390,7 +9654,7 @@
       </p:grpSpPr>
       <p:sp>
         <p:nvSpPr>
-          <p:cNvPr id="164" name="Google Shape;164;p24"/>
+          <p:cNvPr id="170" name="Google Shape;170;p25"/>
           <p:cNvSpPr txBox="1"/>
           <p:nvPr>
             <p:ph type="title"/>
@@ -9430,7 +9694,7 @@
       </p:sp>
       <p:pic>
         <p:nvPicPr>
-          <p:cNvPr id="165" name="Google Shape;165;p24"/>
+          <p:cNvPr id="171" name="Google Shape;171;p25"/>
           <p:cNvPicPr preferRelativeResize="0"/>
           <p:nvPr/>
         </p:nvPicPr>
@@ -9458,7 +9722,7 @@
       </p:pic>
       <p:pic>
         <p:nvPicPr>
-          <p:cNvPr id="166" name="Google Shape;166;p24"/>
+          <p:cNvPr id="172" name="Google Shape;172;p25"/>
           <p:cNvPicPr preferRelativeResize="0"/>
           <p:nvPr/>
         </p:nvPicPr>
@@ -9492,12 +9756,12 @@
 </p:sld>
 </file>
 
-<file path=ppt/slides/slide13.xml><?xml version="1.0" encoding="utf-8"?>
+<file path=ppt/slides/slide14.xml><?xml version="1.0" encoding="utf-8"?>
 <p:sld xmlns:a="http://schemas.openxmlformats.org/drawingml/2006/main" xmlns:r="http://schemas.openxmlformats.org/officeDocument/2006/relationships" xmlns:mc="http://schemas.openxmlformats.org/markup-compatibility/2006" xmlns:mv="urn:schemas-microsoft-com:mac:vml" xmlns:p="http://schemas.openxmlformats.org/presentationml/2006/main" xmlns:c="http://schemas.openxmlformats.org/drawingml/2006/chart" xmlns:dgm="http://schemas.openxmlformats.org/drawingml/2006/diagram" xmlns:o="urn:schemas-microsoft-com:office:office" xmlns:v="urn:schemas-microsoft-com:vml" xmlns:pvml="urn:schemas-microsoft-com:office:powerpoint" xmlns:com="http://schemas.openxmlformats.org/drawingml/2006/compatibility" xmlns:p14="http://schemas.microsoft.com/office/powerpoint/2010/main" xmlns:p15="http://schemas.microsoft.com/office/powerpoint/2012/main">
   <p:cSld>
     <p:spTree>
       <p:nvGrpSpPr>
-        <p:cNvPr id="170" name="Shape 170"/>
+        <p:cNvPr id="176" name="Shape 176"/>
         <p:cNvGrpSpPr/>
         <p:nvPr/>
       </p:nvGrpSpPr>
@@ -9511,7 +9775,7 @@
       </p:grpSpPr>
       <p:sp>
         <p:nvSpPr>
-          <p:cNvPr id="171" name="Google Shape;171;p25"/>
+          <p:cNvPr id="177" name="Google Shape;177;p26"/>
           <p:cNvSpPr txBox="1"/>
           <p:nvPr>
             <p:ph type="title"/>
@@ -9551,7 +9815,7 @@
       </p:sp>
       <p:sp>
         <p:nvSpPr>
-          <p:cNvPr id="172" name="Google Shape;172;p25"/>
+          <p:cNvPr id="178" name="Google Shape;178;p26"/>
           <p:cNvSpPr txBox="1"/>
           <p:nvPr>
             <p:ph idx="2" type="body"/>
@@ -9771,7 +10035,7 @@
       </p:sp>
       <p:sp>
         <p:nvSpPr>
-          <p:cNvPr id="173" name="Google Shape;173;p25"/>
+          <p:cNvPr id="179" name="Google Shape;179;p26"/>
           <p:cNvSpPr txBox="1"/>
           <p:nvPr>
             <p:ph idx="1" type="subTitle"/>
@@ -9806,111 +10070,6 @@
               <a:t>RETROSPECTIVE/CONCLUSION</a:t>
             </a:r>
             <a:endParaRPr b="1"/>
-          </a:p>
-        </p:txBody>
-      </p:sp>
-    </p:spTree>
-  </p:cSld>
-  <p:clrMapOvr>
-    <a:masterClrMapping/>
-  </p:clrMapOvr>
-</p:sld>
-</file>
-
-<file path=ppt/slides/slide14.xml><?xml version="1.0" encoding="utf-8"?>
-<p:sld xmlns:a="http://schemas.openxmlformats.org/drawingml/2006/main" xmlns:r="http://schemas.openxmlformats.org/officeDocument/2006/relationships" xmlns:mc="http://schemas.openxmlformats.org/markup-compatibility/2006" xmlns:mv="urn:schemas-microsoft-com:mac:vml" xmlns:p="http://schemas.openxmlformats.org/presentationml/2006/main" xmlns:c="http://schemas.openxmlformats.org/drawingml/2006/chart" xmlns:dgm="http://schemas.openxmlformats.org/drawingml/2006/diagram" xmlns:o="urn:schemas-microsoft-com:office:office" xmlns:v="urn:schemas-microsoft-com:vml" xmlns:pvml="urn:schemas-microsoft-com:office:powerpoint" xmlns:com="http://schemas.openxmlformats.org/drawingml/2006/compatibility" xmlns:p14="http://schemas.microsoft.com/office/powerpoint/2010/main" xmlns:p15="http://schemas.microsoft.com/office/powerpoint/2012/main">
-  <p:cSld>
-    <p:spTree>
-      <p:nvGrpSpPr>
-        <p:cNvPr id="177" name="Shape 177"/>
-        <p:cNvGrpSpPr/>
-        <p:nvPr/>
-      </p:nvGrpSpPr>
-      <p:grpSpPr>
-        <a:xfrm>
-          <a:off x="0" y="0"/>
-          <a:ext cx="0" cy="0"/>
-          <a:chOff x="0" y="0"/>
-          <a:chExt cx="0" cy="0"/>
-        </a:xfrm>
-      </p:grpSpPr>
-      <p:sp>
-        <p:nvSpPr>
-          <p:cNvPr id="178" name="Google Shape;178;p26"/>
-          <p:cNvSpPr txBox="1"/>
-          <p:nvPr>
-            <p:ph type="title"/>
-          </p:nvPr>
-        </p:nvSpPr>
-        <p:spPr>
-          <a:xfrm>
-            <a:off x="729450" y="733950"/>
-            <a:ext cx="7688400" cy="1244700"/>
-          </a:xfrm>
-          <a:prstGeom prst="rect">
-            <a:avLst/>
-          </a:prstGeom>
-        </p:spPr>
-        <p:txBody>
-          <a:bodyPr anchorCtr="0" anchor="t" bIns="91425" lIns="91425" spcFirstLastPara="1" rIns="91425" wrap="square" tIns="91425">
-            <a:noAutofit/>
-          </a:bodyPr>
-          <a:lstStyle/>
-          <a:p>
-            <a:pPr indent="0" lvl="0" marL="0" rtl="0" algn="l">
-              <a:spcBef>
-                <a:spcPts val="0"/>
-              </a:spcBef>
-              <a:spcAft>
-                <a:spcPts val="0"/>
-              </a:spcAft>
-              <a:buNone/>
-            </a:pPr>
-            <a:r>
-              <a:rPr lang="en" sz="7200"/>
-              <a:t>QUESTION TIME</a:t>
-            </a:r>
-            <a:endParaRPr sz="7200"/>
-          </a:p>
-        </p:txBody>
-      </p:sp>
-      <p:sp>
-        <p:nvSpPr>
-          <p:cNvPr id="179" name="Google Shape;179;p26"/>
-          <p:cNvSpPr txBox="1"/>
-          <p:nvPr>
-            <p:ph idx="1" type="body"/>
-          </p:nvPr>
-        </p:nvSpPr>
-        <p:spPr>
-          <a:xfrm>
-            <a:off x="729450" y="2272888"/>
-            <a:ext cx="7688400" cy="1580400"/>
-          </a:xfrm>
-          <a:prstGeom prst="rect">
-            <a:avLst/>
-          </a:prstGeom>
-        </p:spPr>
-        <p:txBody>
-          <a:bodyPr anchorCtr="0" anchor="t" bIns="91425" lIns="91425" spcFirstLastPara="1" rIns="91425" wrap="square" tIns="91425">
-            <a:noAutofit/>
-          </a:bodyPr>
-          <a:lstStyle/>
-          <a:p>
-            <a:pPr indent="0" lvl="0" marL="0" rtl="0" algn="l">
-              <a:spcBef>
-                <a:spcPts val="0"/>
-              </a:spcBef>
-              <a:spcAft>
-                <a:spcPts val="1600"/>
-              </a:spcAft>
-              <a:buNone/>
-            </a:pPr>
-            <a:r>
-              <a:rPr lang="en"/>
-              <a:t>Any Questions?</a:t>
-            </a:r>
-            <a:endParaRPr/>
           </a:p>
         </p:txBody>
       </p:sp>
@@ -9942,6 +10101,111 @@
       <p:sp>
         <p:nvSpPr>
           <p:cNvPr id="184" name="Google Shape;184;p27"/>
+          <p:cNvSpPr txBox="1"/>
+          <p:nvPr>
+            <p:ph type="title"/>
+          </p:nvPr>
+        </p:nvSpPr>
+        <p:spPr>
+          <a:xfrm>
+            <a:off x="729450" y="733950"/>
+            <a:ext cx="7688400" cy="1244700"/>
+          </a:xfrm>
+          <a:prstGeom prst="rect">
+            <a:avLst/>
+          </a:prstGeom>
+        </p:spPr>
+        <p:txBody>
+          <a:bodyPr anchorCtr="0" anchor="t" bIns="91425" lIns="91425" spcFirstLastPara="1" rIns="91425" wrap="square" tIns="91425">
+            <a:noAutofit/>
+          </a:bodyPr>
+          <a:lstStyle/>
+          <a:p>
+            <a:pPr indent="0" lvl="0" marL="0" rtl="0" algn="l">
+              <a:spcBef>
+                <a:spcPts val="0"/>
+              </a:spcBef>
+              <a:spcAft>
+                <a:spcPts val="0"/>
+              </a:spcAft>
+              <a:buNone/>
+            </a:pPr>
+            <a:r>
+              <a:rPr lang="en" sz="7200"/>
+              <a:t>QUESTION TIME</a:t>
+            </a:r>
+            <a:endParaRPr sz="7200"/>
+          </a:p>
+        </p:txBody>
+      </p:sp>
+      <p:sp>
+        <p:nvSpPr>
+          <p:cNvPr id="185" name="Google Shape;185;p27"/>
+          <p:cNvSpPr txBox="1"/>
+          <p:nvPr>
+            <p:ph idx="1" type="body"/>
+          </p:nvPr>
+        </p:nvSpPr>
+        <p:spPr>
+          <a:xfrm>
+            <a:off x="729450" y="2272888"/>
+            <a:ext cx="7688400" cy="1580400"/>
+          </a:xfrm>
+          <a:prstGeom prst="rect">
+            <a:avLst/>
+          </a:prstGeom>
+        </p:spPr>
+        <p:txBody>
+          <a:bodyPr anchorCtr="0" anchor="t" bIns="91425" lIns="91425" spcFirstLastPara="1" rIns="91425" wrap="square" tIns="91425">
+            <a:noAutofit/>
+          </a:bodyPr>
+          <a:lstStyle/>
+          <a:p>
+            <a:pPr indent="0" lvl="0" marL="0" rtl="0" algn="l">
+              <a:spcBef>
+                <a:spcPts val="0"/>
+              </a:spcBef>
+              <a:spcAft>
+                <a:spcPts val="1600"/>
+              </a:spcAft>
+              <a:buNone/>
+            </a:pPr>
+            <a:r>
+              <a:rPr lang="en"/>
+              <a:t>Any Questions?</a:t>
+            </a:r>
+            <a:endParaRPr/>
+          </a:p>
+        </p:txBody>
+      </p:sp>
+    </p:spTree>
+  </p:cSld>
+  <p:clrMapOvr>
+    <a:masterClrMapping/>
+  </p:clrMapOvr>
+</p:sld>
+</file>
+
+<file path=ppt/slides/slide16.xml><?xml version="1.0" encoding="utf-8"?>
+<p:sld xmlns:a="http://schemas.openxmlformats.org/drawingml/2006/main" xmlns:r="http://schemas.openxmlformats.org/officeDocument/2006/relationships" xmlns:mc="http://schemas.openxmlformats.org/markup-compatibility/2006" xmlns:mv="urn:schemas-microsoft-com:mac:vml" xmlns:p="http://schemas.openxmlformats.org/presentationml/2006/main" xmlns:c="http://schemas.openxmlformats.org/drawingml/2006/chart" xmlns:dgm="http://schemas.openxmlformats.org/drawingml/2006/diagram" xmlns:o="urn:schemas-microsoft-com:office:office" xmlns:v="urn:schemas-microsoft-com:vml" xmlns:pvml="urn:schemas-microsoft-com:office:powerpoint" xmlns:com="http://schemas.openxmlformats.org/drawingml/2006/compatibility" xmlns:p14="http://schemas.microsoft.com/office/powerpoint/2010/main" xmlns:p15="http://schemas.microsoft.com/office/powerpoint/2012/main">
+  <p:cSld>
+    <p:spTree>
+      <p:nvGrpSpPr>
+        <p:cNvPr id="189" name="Shape 189"/>
+        <p:cNvGrpSpPr/>
+        <p:nvPr/>
+      </p:nvGrpSpPr>
+      <p:grpSpPr>
+        <a:xfrm>
+          <a:off x="0" y="0"/>
+          <a:ext cx="0" cy="0"/>
+          <a:chOff x="0" y="0"/>
+          <a:chExt cx="0" cy="0"/>
+        </a:xfrm>
+      </p:grpSpPr>
+      <p:sp>
+        <p:nvSpPr>
+          <p:cNvPr id="190" name="Google Shape;190;p28"/>
           <p:cNvSpPr txBox="1"/>
           <p:nvPr>
             <p:ph type="title"/>
@@ -10014,7 +10278,7 @@
         </p:nvSpPr>
         <p:spPr>
           <a:xfrm>
-            <a:off x="729450" y="1157800"/>
+            <a:off x="729450" y="1234000"/>
             <a:ext cx="7688700" cy="535200"/>
           </a:xfrm>
           <a:prstGeom prst="rect">
@@ -10038,7 +10302,7 @@
             </a:pPr>
             <a:r>
               <a:rPr lang="en"/>
-              <a:t>Scope</a:t>
+              <a:t>Concept of project</a:t>
             </a:r>
             <a:endParaRPr/>
           </a:p>
@@ -10054,7 +10318,7 @@
         </p:nvSpPr>
         <p:spPr>
           <a:xfrm>
-            <a:off x="729450" y="1757175"/>
+            <a:off x="729450" y="2180600"/>
             <a:ext cx="7688700" cy="2261100"/>
           </a:xfrm>
           <a:prstGeom prst="rect">
@@ -10067,121 +10331,151 @@
           </a:bodyPr>
           <a:lstStyle/>
           <a:p>
-            <a:pPr indent="0" lvl="0" marL="0" rtl="0" algn="l">
+            <a:pPr indent="-317500" lvl="0" marL="457200" rtl="0" algn="l">
+              <a:lnSpc>
+                <a:spcPct val="150000"/>
+              </a:lnSpc>
               <a:spcBef>
                 <a:spcPts val="1200"/>
               </a:spcBef>
               <a:spcAft>
                 <a:spcPts val="0"/>
               </a:spcAft>
-              <a:buNone/>
+              <a:buSzPts val="1400"/>
+              <a:buChar char="●"/>
             </a:pPr>
             <a:r>
-              <a:rPr lang="en"/>
-              <a:t>This project aims t</a:t>
-            </a:r>
-            <a:r>
-              <a:rPr lang="en"/>
-              <a:t>o create a full-stack web application following the Enterprise Architecture Model, using;</a:t>
-            </a:r>
-            <a:endParaRPr/>
+              <a:rPr lang="en" sz="1400"/>
+              <a:t>The concept of this project came from my love for food.</a:t>
+            </a:r>
+            <a:endParaRPr sz="1400"/>
           </a:p>
           <a:p>
-            <a:pPr indent="-311150" lvl="0" marL="457200" rtl="0" algn="l">
-              <a:spcBef>
-                <a:spcPts val="1200"/>
-              </a:spcBef>
-              <a:spcAft>
-                <a:spcPts val="0"/>
-              </a:spcAft>
-              <a:buSzPts val="1300"/>
+            <a:pPr indent="-317500" lvl="0" marL="457200" rtl="0" algn="l">
+              <a:lnSpc>
+                <a:spcPct val="150000"/>
+              </a:lnSpc>
+              <a:spcBef>
+                <a:spcPts val="0"/>
+              </a:spcBef>
+              <a:spcAft>
+                <a:spcPts val="0"/>
+              </a:spcAft>
+              <a:buSzPts val="1400"/>
               <a:buChar char="●"/>
             </a:pPr>
             <a:r>
-              <a:rPr lang="en"/>
-              <a:t>an application back-end developed using Java.</a:t>
-            </a:r>
-            <a:endParaRPr/>
+              <a:rPr lang="en" sz="1400"/>
+              <a:t>The project sets out to allow users to collate recipes with respect to various food qualities.</a:t>
+            </a:r>
+            <a:endParaRPr sz="1400"/>
           </a:p>
           <a:p>
-            <a:pPr indent="-311150" lvl="0" marL="457200" rtl="0" algn="l">
-              <a:spcBef>
-                <a:spcPts val="0"/>
-              </a:spcBef>
-              <a:spcAft>
-                <a:spcPts val="0"/>
-              </a:spcAft>
-              <a:buSzPts val="1300"/>
+            <a:pPr indent="-317500" lvl="0" marL="457200" rtl="0" algn="l">
+              <a:lnSpc>
+                <a:spcPct val="150000"/>
+              </a:lnSpc>
+              <a:spcBef>
+                <a:spcPts val="0"/>
+              </a:spcBef>
+              <a:spcAft>
+                <a:spcPts val="0"/>
+              </a:spcAft>
+              <a:buSzPts val="1400"/>
               <a:buChar char="●"/>
             </a:pPr>
             <a:r>
-              <a:rPr lang="en"/>
-              <a:t>a managed database hosted within. MySQL in GCP.</a:t>
-            </a:r>
-            <a:endParaRPr/>
+              <a:rPr lang="en" sz="1400"/>
+              <a:t>The project sets out to make an application that allows users retrieve and upload recipes;</a:t>
+            </a:r>
+            <a:endParaRPr sz="1400"/>
           </a:p>
           <a:p>
-            <a:pPr indent="-311150" lvl="0" marL="457200" rtl="0" algn="l">
-              <a:spcBef>
-                <a:spcPts val="0"/>
-              </a:spcBef>
-              <a:spcAft>
-                <a:spcPts val="0"/>
-              </a:spcAft>
-              <a:buSzPts val="1300"/>
-              <a:buChar char="●"/>
+            <a:pPr indent="-304800" lvl="1" marL="914400" rtl="0" algn="l">
+              <a:spcBef>
+                <a:spcPts val="0"/>
+              </a:spcBef>
+              <a:spcAft>
+                <a:spcPts val="0"/>
+              </a:spcAft>
+              <a:buSzPts val="1200"/>
+              <a:buChar char="○"/>
             </a:pPr>
             <a:r>
-              <a:rPr lang="en"/>
-              <a:t>a front-end developed using JavaScript, HTML, CSS.</a:t>
-            </a:r>
-            <a:endParaRPr/>
+              <a:rPr lang="en" sz="1200"/>
+              <a:t>with functions that allow to categories foods by food groups.</a:t>
+            </a:r>
+            <a:endParaRPr sz="1200"/>
+          </a:p>
+          <a:p>
+            <a:pPr indent="-304800" lvl="1" marL="914400" rtl="0" algn="l">
+              <a:spcBef>
+                <a:spcPts val="0"/>
+              </a:spcBef>
+              <a:spcAft>
+                <a:spcPts val="0"/>
+              </a:spcAft>
+              <a:buSzPts val="1200"/>
+              <a:buChar char="○"/>
+            </a:pPr>
+            <a:r>
+              <a:rPr lang="en" sz="1200"/>
+              <a:t>w</a:t>
+            </a:r>
+            <a:r>
+              <a:rPr lang="en" sz="1200"/>
+              <a:t>ith functions that allow to categories foods by nutritional values.</a:t>
+            </a:r>
+            <a:endParaRPr sz="1200"/>
+          </a:p>
+          <a:p>
+            <a:pPr indent="-304800" lvl="1" marL="914400" rtl="0" algn="l">
+              <a:spcBef>
+                <a:spcPts val="0"/>
+              </a:spcBef>
+              <a:spcAft>
+                <a:spcPts val="0"/>
+              </a:spcAft>
+              <a:buSzPts val="1200"/>
+              <a:buChar char="○"/>
+            </a:pPr>
+            <a:r>
+              <a:rPr lang="en" sz="1200"/>
+              <a:t>with functions that allow to categories foods by caloric values.</a:t>
+            </a:r>
+            <a:endParaRPr sz="1200"/>
+          </a:p>
+          <a:p>
+            <a:pPr indent="-304800" lvl="1" marL="914400" rtl="0" algn="l">
+              <a:spcBef>
+                <a:spcPts val="0"/>
+              </a:spcBef>
+              <a:spcAft>
+                <a:spcPts val="0"/>
+              </a:spcAft>
+              <a:buSzPts val="1200"/>
+              <a:buChar char="○"/>
+            </a:pPr>
+            <a:r>
+              <a:rPr lang="en" sz="1200"/>
+              <a:t>with functions that allow for users to be able to populate a recipe by using the ingredients in database. </a:t>
+            </a:r>
+            <a:endParaRPr sz="1200"/>
           </a:p>
           <a:p>
             <a:pPr indent="0" lvl="0" marL="0" rtl="0" algn="l">
-              <a:lnSpc>
-                <a:spcPct val="100000"/>
-              </a:lnSpc>
               <a:spcBef>
                 <a:spcPts val="1200"/>
               </a:spcBef>
               <a:spcAft>
-                <a:spcPts val="0"/>
+                <a:spcPts val="1200"/>
               </a:spcAft>
               <a:buNone/>
             </a:pPr>
             <a:r>
               <a:t/>
             </a:r>
-            <a:endParaRPr/>
-          </a:p>
-          <a:p>
-            <a:pPr indent="0" lvl="0" marL="0" rtl="0" algn="l">
-              <a:spcBef>
-                <a:spcPts val="1200"/>
-              </a:spcBef>
-              <a:spcAft>
-                <a:spcPts val="1200"/>
-              </a:spcAft>
-              <a:buNone/>
-            </a:pPr>
-            <a:r>
-              <a:rPr lang="en"/>
-              <a:t>This is to be achieved</a:t>
-            </a:r>
-            <a:r>
-              <a:rPr lang="en"/>
-              <a:t> by utilising methodologies that have been covered in previous modules such as planning the project using the design techniques (Kanban Boards). Utilise a CI Pipeline in order to automate the building and deployment of my </a:t>
-            </a:r>
-            <a:r>
-              <a:rPr lang="en"/>
-              <a:t>artifact (Jankins, Sonarqube &amp; Nexus)</a:t>
-            </a:r>
-            <a:r>
-              <a:rPr lang="en"/>
-              <a:t>. The project is to be tested using JUnit, Integration and Selenium testing methods. </a:t>
-            </a:r>
-            <a:endParaRPr/>
+            <a:endParaRPr sz="1400"/>
           </a:p>
         </p:txBody>
       </p:sp>
@@ -10220,7 +10514,7 @@
         </p:nvSpPr>
         <p:spPr>
           <a:xfrm>
-            <a:off x="729450" y="1090050"/>
+            <a:off x="729450" y="1157800"/>
             <a:ext cx="7688700" cy="535200"/>
           </a:xfrm>
           <a:prstGeom prst="rect">
@@ -10244,7 +10538,7 @@
             </a:pPr>
             <a:r>
               <a:rPr lang="en"/>
-              <a:t>Specification</a:t>
+              <a:t>Scope</a:t>
             </a:r>
             <a:endParaRPr/>
           </a:p>
@@ -10260,8 +10554,8 @@
         </p:nvSpPr>
         <p:spPr>
           <a:xfrm>
-            <a:off x="729450" y="1545475"/>
-            <a:ext cx="7722600" cy="3621600"/>
+            <a:off x="729450" y="1757175"/>
+            <a:ext cx="7688700" cy="2261100"/>
           </a:xfrm>
           <a:prstGeom prst="rect">
             <a:avLst/>
@@ -10274,11 +10568,8 @@
           <a:lstStyle/>
           <a:p>
             <a:pPr indent="0" lvl="0" marL="0" rtl="0" algn="l">
-              <a:lnSpc>
-                <a:spcPct val="115000"/>
-              </a:lnSpc>
-              <a:spcBef>
-                <a:spcPts val="0"/>
+              <a:spcBef>
+                <a:spcPts val="1200"/>
               </a:spcBef>
               <a:spcAft>
                 <a:spcPts val="0"/>
@@ -10286,144 +10577,95 @@
               <a:buNone/>
             </a:pPr>
             <a:r>
-              <a:rPr lang="en" sz="1200"/>
-              <a:t>The project is to be achieved by the implementation of the following concepts;</a:t>
-            </a:r>
-            <a:endParaRPr sz="1200"/>
+              <a:rPr lang="en"/>
+              <a:t>This project aims to create a full-stack web application following the Enterprise Architecture Model, using;</a:t>
+            </a:r>
+            <a:endParaRPr/>
           </a:p>
           <a:p>
-            <a:pPr indent="-304800" lvl="0" marL="457200" rtl="0" algn="l">
-              <a:lnSpc>
-                <a:spcPct val="115000"/>
-              </a:lnSpc>
-              <a:spcBef>
-                <a:spcPts val="1600"/>
-              </a:spcBef>
-              <a:spcAft>
-                <a:spcPts val="0"/>
-              </a:spcAft>
-              <a:buSzPts val="1200"/>
+            <a:pPr indent="-311150" lvl="0" marL="457200" rtl="0" algn="l">
+              <a:spcBef>
+                <a:spcPts val="1200"/>
+              </a:spcBef>
+              <a:spcAft>
+                <a:spcPts val="0"/>
+              </a:spcAft>
+              <a:buSzPts val="1300"/>
               <a:buChar char="●"/>
             </a:pPr>
             <a:r>
-              <a:rPr lang="en" sz="1200"/>
-              <a:t>Agile &amp; Project Management - a Kanban board with user stories and tasks needed to complete the project.</a:t>
-            </a:r>
-            <a:endParaRPr sz="1200"/>
+              <a:rPr lang="en"/>
+              <a:t>an application back-end developed using Java.</a:t>
+            </a:r>
+            <a:endParaRPr/>
           </a:p>
           <a:p>
-            <a:pPr indent="-304800" lvl="0" marL="457200" rtl="0" algn="l">
-              <a:lnSpc>
-                <a:spcPct val="115000"/>
-              </a:lnSpc>
-              <a:spcBef>
-                <a:spcPts val="0"/>
-              </a:spcBef>
-              <a:spcAft>
-                <a:spcPts val="0"/>
-              </a:spcAft>
-              <a:buSzPts val="1200"/>
+            <a:pPr indent="-311150" lvl="0" marL="457200" rtl="0" algn="l">
+              <a:spcBef>
+                <a:spcPts val="0"/>
+              </a:spcBef>
+              <a:spcAft>
+                <a:spcPts val="0"/>
+              </a:spcAft>
+              <a:buSzPts val="1300"/>
               <a:buChar char="●"/>
             </a:pPr>
             <a:r>
-              <a:rPr lang="en" sz="1200"/>
-              <a:t>Databases - a relational database will be  used to store data persistently for the project, with at least 2 tables that exhibit functionality relationships.</a:t>
-            </a:r>
-            <a:endParaRPr sz="1200"/>
+              <a:rPr lang="en"/>
+              <a:t>a managed database hosted within. MySQL in GCP.</a:t>
+            </a:r>
+            <a:endParaRPr/>
           </a:p>
           <a:p>
-            <a:pPr indent="-304800" lvl="0" marL="457200" rtl="0" algn="l">
-              <a:lnSpc>
-                <a:spcPct val="115000"/>
-              </a:lnSpc>
-              <a:spcBef>
-                <a:spcPts val="0"/>
-              </a:spcBef>
-              <a:spcAft>
-                <a:spcPts val="0"/>
-              </a:spcAft>
-              <a:buSzPts val="1200"/>
+            <a:pPr indent="-311150" lvl="0" marL="457200" rtl="0" algn="l">
+              <a:spcBef>
+                <a:spcPts val="0"/>
+              </a:spcBef>
+              <a:spcAft>
+                <a:spcPts val="0"/>
+              </a:spcAft>
+              <a:buSzPts val="1300"/>
               <a:buChar char="●"/>
             </a:pPr>
             <a:r>
-              <a:rPr lang="en" sz="1200"/>
-              <a:t>Back-end Programming Fundamentals - a functional application that adheres to best practices and design principles, composed in Java language and meets the requirements set on your Kanban Board.</a:t>
-            </a:r>
-            <a:endParaRPr sz="1200"/>
+              <a:rPr lang="en"/>
+              <a:t>a front-end developed using JavaScript, HTML, CSS.</a:t>
+            </a:r>
+            <a:endParaRPr/>
           </a:p>
           <a:p>
-            <a:pPr indent="-304800" lvl="0" marL="457200" rtl="0" algn="l">
-              <a:spcBef>
-                <a:spcPts val="0"/>
-              </a:spcBef>
-              <a:spcAft>
-                <a:spcPts val="0"/>
-              </a:spcAft>
-              <a:buSzPts val="1200"/>
-              <a:buChar char="●"/>
+            <a:pPr indent="0" lvl="0" marL="0" rtl="0" algn="l">
+              <a:lnSpc>
+                <a:spcPct val="100000"/>
+              </a:lnSpc>
+              <a:spcBef>
+                <a:spcPts val="1200"/>
+              </a:spcBef>
+              <a:spcAft>
+                <a:spcPts val="0"/>
+              </a:spcAft>
+              <a:buNone/>
             </a:pPr>
             <a:r>
-              <a:rPr lang="en" sz="1200"/>
-              <a:t>Front-end Programming Fundamentals - a functional application that adheres to best practices and design principles, composed in JavaScript, HTML, CSS. This is to also  meets the requirements set on your Kanban Board.</a:t>
-            </a:r>
-            <a:endParaRPr sz="1200"/>
+              <a:t/>
+            </a:r>
+            <a:endParaRPr/>
           </a:p>
           <a:p>
-            <a:pPr indent="-304800" lvl="0" marL="457200" rtl="0" algn="l">
-              <a:lnSpc>
-                <a:spcPct val="115000"/>
-              </a:lnSpc>
-              <a:spcBef>
-                <a:spcPts val="0"/>
-              </a:spcBef>
-              <a:spcAft>
-                <a:spcPts val="0"/>
-              </a:spcAft>
-              <a:buSzPts val="1200"/>
-              <a:buChar char="●"/>
+            <a:pPr indent="0" lvl="0" marL="0" rtl="0" algn="l">
+              <a:spcBef>
+                <a:spcPts val="1200"/>
+              </a:spcBef>
+              <a:spcAft>
+                <a:spcPts val="1200"/>
+              </a:spcAft>
+              <a:buNone/>
             </a:pPr>
             <a:r>
-              <a:rPr lang="en" sz="1200"/>
-              <a:t>Automated Testing - unit tests and integration tests are used to validate application.</a:t>
-            </a:r>
-            <a:endParaRPr sz="1200"/>
-          </a:p>
-          <a:p>
-            <a:pPr indent="-304800" lvl="0" marL="457200" rtl="0" algn="l">
-              <a:spcBef>
-                <a:spcPts val="0"/>
-              </a:spcBef>
-              <a:spcAft>
-                <a:spcPts val="0"/>
-              </a:spcAft>
-              <a:buSzPts val="1200"/>
-              <a:buChar char="●"/>
-            </a:pPr>
-            <a:r>
-              <a:rPr lang="en" sz="1200"/>
-              <a:t>Selenium Testing - unit tests and integration tests are used to validate application.</a:t>
-            </a:r>
-            <a:endParaRPr sz="1200"/>
-          </a:p>
-          <a:p>
-            <a:pPr indent="-304800" lvl="0" marL="457200" rtl="0" algn="l">
-              <a:lnSpc>
-                <a:spcPct val="115000"/>
-              </a:lnSpc>
-              <a:spcBef>
-                <a:spcPts val="0"/>
-              </a:spcBef>
-              <a:spcAft>
-                <a:spcPts val="0"/>
-              </a:spcAft>
-              <a:buSzPts val="1200"/>
-              <a:buChar char="●"/>
-            </a:pPr>
-            <a:r>
-              <a:rPr lang="en" sz="1200"/>
-              <a:t>Continuous Integration - use of Version Control System to fully integrate the code into a CI server and deployed to an artifact repository manager.</a:t>
-            </a:r>
-            <a:endParaRPr sz="1200"/>
+              <a:rPr lang="en"/>
+              <a:t>This is to be achieved by utilising methodologies that have been covered in previous modules such as planning the project using the design techniques (Kanban Boards). Utilise a CI Pipeline in order to automate the building and deployment of my artifact (Jankins, Sonarqube &amp; Nexus). The project is to be tested using JUnit, Integration and Selenium testing methods. </a:t>
+            </a:r>
+            <a:endParaRPr/>
           </a:p>
         </p:txBody>
       </p:sp>
@@ -10462,6 +10704,248 @@
         </p:nvSpPr>
         <p:spPr>
           <a:xfrm>
+            <a:off x="729450" y="1090050"/>
+            <a:ext cx="7688700" cy="535200"/>
+          </a:xfrm>
+          <a:prstGeom prst="rect">
+            <a:avLst/>
+          </a:prstGeom>
+        </p:spPr>
+        <p:txBody>
+          <a:bodyPr anchorCtr="0" anchor="t" bIns="91425" lIns="91425" spcFirstLastPara="1" rIns="91425" wrap="square" tIns="91425">
+            <a:noAutofit/>
+          </a:bodyPr>
+          <a:lstStyle/>
+          <a:p>
+            <a:pPr indent="0" lvl="0" marL="0" rtl="0" algn="l">
+              <a:spcBef>
+                <a:spcPts val="0"/>
+              </a:spcBef>
+              <a:spcAft>
+                <a:spcPts val="0"/>
+              </a:spcAft>
+              <a:buNone/>
+            </a:pPr>
+            <a:r>
+              <a:rPr lang="en"/>
+              <a:t>Specification</a:t>
+            </a:r>
+            <a:endParaRPr/>
+          </a:p>
+        </p:txBody>
+      </p:sp>
+      <p:sp>
+        <p:nvSpPr>
+          <p:cNvPr id="105" name="Google Shape;105;p16"/>
+          <p:cNvSpPr txBox="1"/>
+          <p:nvPr>
+            <p:ph idx="1" type="body"/>
+          </p:nvPr>
+        </p:nvSpPr>
+        <p:spPr>
+          <a:xfrm>
+            <a:off x="729450" y="1545475"/>
+            <a:ext cx="7722600" cy="3621600"/>
+          </a:xfrm>
+          <a:prstGeom prst="rect">
+            <a:avLst/>
+          </a:prstGeom>
+        </p:spPr>
+        <p:txBody>
+          <a:bodyPr anchorCtr="0" anchor="t" bIns="91425" lIns="91425" spcFirstLastPara="1" rIns="91425" wrap="square" tIns="91425">
+            <a:noAutofit/>
+          </a:bodyPr>
+          <a:lstStyle/>
+          <a:p>
+            <a:pPr indent="0" lvl="0" marL="0" rtl="0" algn="l">
+              <a:lnSpc>
+                <a:spcPct val="115000"/>
+              </a:lnSpc>
+              <a:spcBef>
+                <a:spcPts val="0"/>
+              </a:spcBef>
+              <a:spcAft>
+                <a:spcPts val="0"/>
+              </a:spcAft>
+              <a:buNone/>
+            </a:pPr>
+            <a:r>
+              <a:rPr lang="en" sz="1200"/>
+              <a:t>The project is to be achieved by the implementation of the following concepts;</a:t>
+            </a:r>
+            <a:endParaRPr sz="1200"/>
+          </a:p>
+          <a:p>
+            <a:pPr indent="-304800" lvl="0" marL="457200" rtl="0" algn="l">
+              <a:lnSpc>
+                <a:spcPct val="115000"/>
+              </a:lnSpc>
+              <a:spcBef>
+                <a:spcPts val="1600"/>
+              </a:spcBef>
+              <a:spcAft>
+                <a:spcPts val="0"/>
+              </a:spcAft>
+              <a:buSzPts val="1200"/>
+              <a:buChar char="●"/>
+            </a:pPr>
+            <a:r>
+              <a:rPr lang="en" sz="1200"/>
+              <a:t>Agile &amp; Project Management - a Kanban board with user stories and tasks needed to complete the project.</a:t>
+            </a:r>
+            <a:endParaRPr sz="1200"/>
+          </a:p>
+          <a:p>
+            <a:pPr indent="-304800" lvl="0" marL="457200" rtl="0" algn="l">
+              <a:lnSpc>
+                <a:spcPct val="115000"/>
+              </a:lnSpc>
+              <a:spcBef>
+                <a:spcPts val="0"/>
+              </a:spcBef>
+              <a:spcAft>
+                <a:spcPts val="0"/>
+              </a:spcAft>
+              <a:buSzPts val="1200"/>
+              <a:buChar char="●"/>
+            </a:pPr>
+            <a:r>
+              <a:rPr lang="en" sz="1200"/>
+              <a:t>Databases - a relational database will be  used to store data persistently for the project, with at least 2 tables that exhibit functionality relationships.</a:t>
+            </a:r>
+            <a:endParaRPr sz="1200"/>
+          </a:p>
+          <a:p>
+            <a:pPr indent="-304800" lvl="0" marL="457200" rtl="0" algn="l">
+              <a:lnSpc>
+                <a:spcPct val="115000"/>
+              </a:lnSpc>
+              <a:spcBef>
+                <a:spcPts val="0"/>
+              </a:spcBef>
+              <a:spcAft>
+                <a:spcPts val="0"/>
+              </a:spcAft>
+              <a:buSzPts val="1200"/>
+              <a:buChar char="●"/>
+            </a:pPr>
+            <a:r>
+              <a:rPr lang="en" sz="1200"/>
+              <a:t>Back-end Programming Fundamentals - a functional application that adheres to best practices and design principles, composed in Java language and meets the requirements set on your Kanban Board.</a:t>
+            </a:r>
+            <a:endParaRPr sz="1200"/>
+          </a:p>
+          <a:p>
+            <a:pPr indent="-304800" lvl="0" marL="457200" rtl="0" algn="l">
+              <a:spcBef>
+                <a:spcPts val="0"/>
+              </a:spcBef>
+              <a:spcAft>
+                <a:spcPts val="0"/>
+              </a:spcAft>
+              <a:buSzPts val="1200"/>
+              <a:buChar char="●"/>
+            </a:pPr>
+            <a:r>
+              <a:rPr lang="en" sz="1200"/>
+              <a:t>Front-end Programming Fundamentals - a functional application that adheres to best practices and design principles, composed in JavaScript, HTML, CSS. This is to also  meets the requirements set on your Kanban Board.</a:t>
+            </a:r>
+            <a:endParaRPr sz="1200"/>
+          </a:p>
+          <a:p>
+            <a:pPr indent="-304800" lvl="0" marL="457200" rtl="0" algn="l">
+              <a:lnSpc>
+                <a:spcPct val="115000"/>
+              </a:lnSpc>
+              <a:spcBef>
+                <a:spcPts val="0"/>
+              </a:spcBef>
+              <a:spcAft>
+                <a:spcPts val="0"/>
+              </a:spcAft>
+              <a:buSzPts val="1200"/>
+              <a:buChar char="●"/>
+            </a:pPr>
+            <a:r>
+              <a:rPr lang="en" sz="1200"/>
+              <a:t>Automated Testing - unit tests and integration tests are used to validate application.</a:t>
+            </a:r>
+            <a:endParaRPr sz="1200"/>
+          </a:p>
+          <a:p>
+            <a:pPr indent="-304800" lvl="0" marL="457200" rtl="0" algn="l">
+              <a:spcBef>
+                <a:spcPts val="0"/>
+              </a:spcBef>
+              <a:spcAft>
+                <a:spcPts val="0"/>
+              </a:spcAft>
+              <a:buSzPts val="1200"/>
+              <a:buChar char="●"/>
+            </a:pPr>
+            <a:r>
+              <a:rPr lang="en" sz="1200"/>
+              <a:t>Selenium Testing - unit tests and integration tests are used to validate application.</a:t>
+            </a:r>
+            <a:endParaRPr sz="1200"/>
+          </a:p>
+          <a:p>
+            <a:pPr indent="-304800" lvl="0" marL="457200" rtl="0" algn="l">
+              <a:lnSpc>
+                <a:spcPct val="115000"/>
+              </a:lnSpc>
+              <a:spcBef>
+                <a:spcPts val="0"/>
+              </a:spcBef>
+              <a:spcAft>
+                <a:spcPts val="0"/>
+              </a:spcAft>
+              <a:buSzPts val="1200"/>
+              <a:buChar char="●"/>
+            </a:pPr>
+            <a:r>
+              <a:rPr lang="en" sz="1200"/>
+              <a:t>Continuous Integration - use of Version Control System to fully integrate the code into a CI server and deployed to an artifact repository manager.</a:t>
+            </a:r>
+            <a:endParaRPr sz="1200"/>
+          </a:p>
+        </p:txBody>
+      </p:sp>
+    </p:spTree>
+  </p:cSld>
+  <p:clrMapOvr>
+    <a:masterClrMapping/>
+  </p:clrMapOvr>
+</p:sld>
+</file>
+
+<file path=ppt/slides/slide5.xml><?xml version="1.0" encoding="utf-8"?>
+<p:sld xmlns:a="http://schemas.openxmlformats.org/drawingml/2006/main" xmlns:r="http://schemas.openxmlformats.org/officeDocument/2006/relationships" xmlns:mc="http://schemas.openxmlformats.org/markup-compatibility/2006" xmlns:mv="urn:schemas-microsoft-com:mac:vml" xmlns:p="http://schemas.openxmlformats.org/presentationml/2006/main" xmlns:c="http://schemas.openxmlformats.org/drawingml/2006/chart" xmlns:dgm="http://schemas.openxmlformats.org/drawingml/2006/diagram" xmlns:o="urn:schemas-microsoft-com:office:office" xmlns:v="urn:schemas-microsoft-com:vml" xmlns:pvml="urn:schemas-microsoft-com:office:powerpoint" xmlns:com="http://schemas.openxmlformats.org/drawingml/2006/compatibility" xmlns:p14="http://schemas.microsoft.com/office/powerpoint/2010/main" xmlns:p15="http://schemas.microsoft.com/office/powerpoint/2012/main">
+  <p:cSld>
+    <p:spTree>
+      <p:nvGrpSpPr>
+        <p:cNvPr id="109" name="Shape 109"/>
+        <p:cNvGrpSpPr/>
+        <p:nvPr/>
+      </p:nvGrpSpPr>
+      <p:grpSpPr>
+        <a:xfrm>
+          <a:off x="0" y="0"/>
+          <a:ext cx="0" cy="0"/>
+          <a:chOff x="0" y="0"/>
+          <a:chExt cx="0" cy="0"/>
+        </a:xfrm>
+      </p:grpSpPr>
+      <p:sp>
+        <p:nvSpPr>
+          <p:cNvPr id="110" name="Google Shape;110;p17"/>
+          <p:cNvSpPr txBox="1"/>
+          <p:nvPr>
+            <p:ph type="title"/>
+          </p:nvPr>
+        </p:nvSpPr>
+        <p:spPr>
+          <a:xfrm>
             <a:off x="730000" y="1318650"/>
             <a:ext cx="3300900" cy="1687200"/>
           </a:xfrm>
@@ -10494,7 +10978,7 @@
       </p:sp>
       <p:sp>
         <p:nvSpPr>
-          <p:cNvPr id="105" name="Google Shape;105;p16"/>
+          <p:cNvPr id="111" name="Google Shape;111;p17"/>
           <p:cNvSpPr txBox="1"/>
           <p:nvPr>
             <p:ph idx="2" type="body"/>
@@ -10762,7 +11246,7 @@
       </p:sp>
       <p:sp>
         <p:nvSpPr>
-          <p:cNvPr id="106" name="Google Shape;106;p16"/>
+          <p:cNvPr id="112" name="Google Shape;112;p17"/>
           <p:cNvSpPr txBox="1"/>
           <p:nvPr>
             <p:ph idx="1" type="subTitle"/>
@@ -10808,12 +11292,12 @@
 </p:sld>
 </file>
 
-<file path=ppt/slides/slide5.xml><?xml version="1.0" encoding="utf-8"?>
+<file path=ppt/slides/slide6.xml><?xml version="1.0" encoding="utf-8"?>
 <p:sld xmlns:a="http://schemas.openxmlformats.org/drawingml/2006/main" xmlns:r="http://schemas.openxmlformats.org/officeDocument/2006/relationships" xmlns:mc="http://schemas.openxmlformats.org/markup-compatibility/2006" xmlns:mv="urn:schemas-microsoft-com:mac:vml" xmlns:p="http://schemas.openxmlformats.org/presentationml/2006/main" xmlns:c="http://schemas.openxmlformats.org/drawingml/2006/chart" xmlns:dgm="http://schemas.openxmlformats.org/drawingml/2006/diagram" xmlns:o="urn:schemas-microsoft-com:office:office" xmlns:v="urn:schemas-microsoft-com:vml" xmlns:pvml="urn:schemas-microsoft-com:office:powerpoint" xmlns:com="http://schemas.openxmlformats.org/drawingml/2006/compatibility" xmlns:p14="http://schemas.microsoft.com/office/powerpoint/2010/main" xmlns:p15="http://schemas.microsoft.com/office/powerpoint/2012/main">
   <p:cSld>
     <p:spTree>
       <p:nvGrpSpPr>
-        <p:cNvPr id="110" name="Shape 110"/>
+        <p:cNvPr id="116" name="Shape 116"/>
         <p:cNvGrpSpPr/>
         <p:nvPr/>
       </p:nvGrpSpPr>
@@ -10827,7 +11311,7 @@
       </p:grpSpPr>
       <p:sp>
         <p:nvSpPr>
-          <p:cNvPr id="111" name="Google Shape;111;p17"/>
+          <p:cNvPr id="117" name="Google Shape;117;p18"/>
           <p:cNvSpPr txBox="1"/>
           <p:nvPr>
             <p:ph type="title"/>
@@ -10867,7 +11351,7 @@
       </p:sp>
       <p:sp>
         <p:nvSpPr>
-          <p:cNvPr id="112" name="Google Shape;112;p17"/>
+          <p:cNvPr id="118" name="Google Shape;118;p18"/>
           <p:cNvSpPr txBox="1"/>
           <p:nvPr>
             <p:ph idx="2" type="body"/>
@@ -11155,7 +11639,7 @@
       </p:sp>
       <p:sp>
         <p:nvSpPr>
-          <p:cNvPr id="113" name="Google Shape;113;p17"/>
+          <p:cNvPr id="119" name="Google Shape;119;p18"/>
           <p:cNvSpPr txBox="1"/>
           <p:nvPr>
             <p:ph idx="1" type="subTitle"/>
@@ -11205,12 +11689,12 @@
 </p:sld>
 </file>
 
-<file path=ppt/slides/slide6.xml><?xml version="1.0" encoding="utf-8"?>
+<file path=ppt/slides/slide7.xml><?xml version="1.0" encoding="utf-8"?>
 <p:sld xmlns:a="http://schemas.openxmlformats.org/drawingml/2006/main" xmlns:r="http://schemas.openxmlformats.org/officeDocument/2006/relationships" xmlns:mc="http://schemas.openxmlformats.org/markup-compatibility/2006" xmlns:mv="urn:schemas-microsoft-com:mac:vml" xmlns:p="http://schemas.openxmlformats.org/presentationml/2006/main" xmlns:c="http://schemas.openxmlformats.org/drawingml/2006/chart" xmlns:dgm="http://schemas.openxmlformats.org/drawingml/2006/diagram" xmlns:o="urn:schemas-microsoft-com:office:office" xmlns:v="urn:schemas-microsoft-com:vml" xmlns:pvml="urn:schemas-microsoft-com:office:powerpoint" xmlns:com="http://schemas.openxmlformats.org/drawingml/2006/compatibility" xmlns:p14="http://schemas.microsoft.com/office/powerpoint/2010/main" xmlns:p15="http://schemas.microsoft.com/office/powerpoint/2012/main">
   <p:cSld>
     <p:spTree>
       <p:nvGrpSpPr>
-        <p:cNvPr id="117" name="Shape 117"/>
+        <p:cNvPr id="123" name="Shape 123"/>
         <p:cNvGrpSpPr/>
         <p:nvPr/>
       </p:nvGrpSpPr>
@@ -11224,7 +11708,7 @@
       </p:grpSpPr>
       <p:sp>
         <p:nvSpPr>
-          <p:cNvPr id="118" name="Google Shape;118;p18"/>
+          <p:cNvPr id="124" name="Google Shape;124;p19"/>
           <p:cNvSpPr txBox="1"/>
           <p:nvPr>
             <p:ph type="title"/>
@@ -11264,7 +11748,7 @@
       </p:sp>
       <p:sp>
         <p:nvSpPr>
-          <p:cNvPr id="119" name="Google Shape;119;p18"/>
+          <p:cNvPr id="125" name="Google Shape;125;p19"/>
           <p:cNvSpPr txBox="1"/>
           <p:nvPr/>
         </p:nvSpPr>
@@ -11371,7 +11855,7 @@
       </p:sp>
       <p:pic>
         <p:nvPicPr>
-          <p:cNvPr id="120" name="Google Shape;120;p18"/>
+          <p:cNvPr id="126" name="Google Shape;126;p19"/>
           <p:cNvPicPr preferRelativeResize="0"/>
           <p:nvPr/>
         </p:nvPicPr>
@@ -11399,7 +11883,7 @@
       </p:pic>
       <p:pic>
         <p:nvPicPr>
-          <p:cNvPr id="121" name="Google Shape;121;p18"/>
+          <p:cNvPr id="127" name="Google Shape;127;p19"/>
           <p:cNvPicPr preferRelativeResize="0"/>
           <p:nvPr/>
         </p:nvPicPr>
@@ -11427,7 +11911,7 @@
       </p:pic>
       <p:pic>
         <p:nvPicPr>
-          <p:cNvPr id="122" name="Google Shape;122;p18"/>
+          <p:cNvPr id="128" name="Google Shape;128;p19"/>
           <p:cNvPicPr preferRelativeResize="0"/>
           <p:nvPr/>
         </p:nvPicPr>
@@ -11443,99 +11927,6 @@
           <a:xfrm>
             <a:off x="7367625" y="1922552"/>
             <a:ext cx="1559150" cy="3080273"/>
-          </a:xfrm>
-          <a:prstGeom prst="rect">
-            <a:avLst/>
-          </a:prstGeom>
-          <a:noFill/>
-          <a:ln>
-            <a:noFill/>
-          </a:ln>
-        </p:spPr>
-      </p:pic>
-    </p:spTree>
-  </p:cSld>
-  <p:clrMapOvr>
-    <a:masterClrMapping/>
-  </p:clrMapOvr>
-</p:sld>
-</file>
-
-<file path=ppt/slides/slide7.xml><?xml version="1.0" encoding="utf-8"?>
-<p:sld xmlns:a="http://schemas.openxmlformats.org/drawingml/2006/main" xmlns:r="http://schemas.openxmlformats.org/officeDocument/2006/relationships" xmlns:mc="http://schemas.openxmlformats.org/markup-compatibility/2006" xmlns:mv="urn:schemas-microsoft-com:mac:vml" xmlns:p="http://schemas.openxmlformats.org/presentationml/2006/main" xmlns:c="http://schemas.openxmlformats.org/drawingml/2006/chart" xmlns:dgm="http://schemas.openxmlformats.org/drawingml/2006/diagram" xmlns:o="urn:schemas-microsoft-com:office:office" xmlns:v="urn:schemas-microsoft-com:vml" xmlns:pvml="urn:schemas-microsoft-com:office:powerpoint" xmlns:com="http://schemas.openxmlformats.org/drawingml/2006/compatibility" xmlns:p14="http://schemas.microsoft.com/office/powerpoint/2010/main" xmlns:p15="http://schemas.microsoft.com/office/powerpoint/2012/main">
-  <p:cSld>
-    <p:spTree>
-      <p:nvGrpSpPr>
-        <p:cNvPr id="126" name="Shape 126"/>
-        <p:cNvGrpSpPr/>
-        <p:nvPr/>
-      </p:nvGrpSpPr>
-      <p:grpSpPr>
-        <a:xfrm>
-          <a:off x="0" y="0"/>
-          <a:ext cx="0" cy="0"/>
-          <a:chOff x="0" y="0"/>
-          <a:chExt cx="0" cy="0"/>
-        </a:xfrm>
-      </p:grpSpPr>
-      <p:sp>
-        <p:nvSpPr>
-          <p:cNvPr id="127" name="Google Shape;127;p19"/>
-          <p:cNvSpPr txBox="1"/>
-          <p:nvPr>
-            <p:ph type="title"/>
-          </p:nvPr>
-        </p:nvSpPr>
-        <p:spPr>
-          <a:xfrm>
-            <a:off x="729450" y="1318650"/>
-            <a:ext cx="7688700" cy="535200"/>
-          </a:xfrm>
-          <a:prstGeom prst="rect">
-            <a:avLst/>
-          </a:prstGeom>
-        </p:spPr>
-        <p:txBody>
-          <a:bodyPr anchorCtr="0" anchor="t" bIns="91425" lIns="91425" spcFirstLastPara="1" rIns="91425" wrap="square" tIns="91425">
-            <a:noAutofit/>
-          </a:bodyPr>
-          <a:lstStyle/>
-          <a:p>
-            <a:pPr indent="0" lvl="0" marL="0" rtl="0" algn="l">
-              <a:spcBef>
-                <a:spcPts val="0"/>
-              </a:spcBef>
-              <a:spcAft>
-                <a:spcPts val="0"/>
-              </a:spcAft>
-              <a:buNone/>
-            </a:pPr>
-            <a:r>
-              <a:rPr lang="en"/>
-              <a:t>Entity Relationship Diagram (ERD)</a:t>
-            </a:r>
-            <a:endParaRPr/>
-          </a:p>
-        </p:txBody>
-      </p:sp>
-      <p:pic>
-        <p:nvPicPr>
-          <p:cNvPr id="128" name="Google Shape;128;p19"/>
-          <p:cNvPicPr preferRelativeResize="0"/>
-          <p:nvPr/>
-        </p:nvPicPr>
-        <p:blipFill>
-          <a:blip r:embed="rId3">
-            <a:alphaModFix/>
-          </a:blip>
-          <a:stretch>
-            <a:fillRect/>
-          </a:stretch>
-        </p:blipFill>
-        <p:spPr>
-          <a:xfrm>
-            <a:off x="1153850" y="2015175"/>
-            <a:ext cx="7016520" cy="2984850"/>
           </a:xfrm>
           <a:prstGeom prst="rect">
             <a:avLst/>
@@ -11581,6 +11972,99 @@
         </p:nvSpPr>
         <p:spPr>
           <a:xfrm>
+            <a:off x="729450" y="1318650"/>
+            <a:ext cx="7688700" cy="535200"/>
+          </a:xfrm>
+          <a:prstGeom prst="rect">
+            <a:avLst/>
+          </a:prstGeom>
+        </p:spPr>
+        <p:txBody>
+          <a:bodyPr anchorCtr="0" anchor="t" bIns="91425" lIns="91425" spcFirstLastPara="1" rIns="91425" wrap="square" tIns="91425">
+            <a:noAutofit/>
+          </a:bodyPr>
+          <a:lstStyle/>
+          <a:p>
+            <a:pPr indent="0" lvl="0" marL="0" rtl="0" algn="l">
+              <a:spcBef>
+                <a:spcPts val="0"/>
+              </a:spcBef>
+              <a:spcAft>
+                <a:spcPts val="0"/>
+              </a:spcAft>
+              <a:buNone/>
+            </a:pPr>
+            <a:r>
+              <a:rPr lang="en"/>
+              <a:t>Entity Relationship Diagram (ERD)</a:t>
+            </a:r>
+            <a:endParaRPr/>
+          </a:p>
+        </p:txBody>
+      </p:sp>
+      <p:pic>
+        <p:nvPicPr>
+          <p:cNvPr id="134" name="Google Shape;134;p20"/>
+          <p:cNvPicPr preferRelativeResize="0"/>
+          <p:nvPr/>
+        </p:nvPicPr>
+        <p:blipFill>
+          <a:blip r:embed="rId3">
+            <a:alphaModFix/>
+          </a:blip>
+          <a:stretch>
+            <a:fillRect/>
+          </a:stretch>
+        </p:blipFill>
+        <p:spPr>
+          <a:xfrm>
+            <a:off x="1153850" y="2015175"/>
+            <a:ext cx="7016520" cy="2984850"/>
+          </a:xfrm>
+          <a:prstGeom prst="rect">
+            <a:avLst/>
+          </a:prstGeom>
+          <a:noFill/>
+          <a:ln>
+            <a:noFill/>
+          </a:ln>
+        </p:spPr>
+      </p:pic>
+    </p:spTree>
+  </p:cSld>
+  <p:clrMapOvr>
+    <a:masterClrMapping/>
+  </p:clrMapOvr>
+</p:sld>
+</file>
+
+<file path=ppt/slides/slide9.xml><?xml version="1.0" encoding="utf-8"?>
+<p:sld xmlns:a="http://schemas.openxmlformats.org/drawingml/2006/main" xmlns:r="http://schemas.openxmlformats.org/officeDocument/2006/relationships" xmlns:mc="http://schemas.openxmlformats.org/markup-compatibility/2006" xmlns:mv="urn:schemas-microsoft-com:mac:vml" xmlns:p="http://schemas.openxmlformats.org/presentationml/2006/main" xmlns:c="http://schemas.openxmlformats.org/drawingml/2006/chart" xmlns:dgm="http://schemas.openxmlformats.org/drawingml/2006/diagram" xmlns:o="urn:schemas-microsoft-com:office:office" xmlns:v="urn:schemas-microsoft-com:vml" xmlns:pvml="urn:schemas-microsoft-com:office:powerpoint" xmlns:com="http://schemas.openxmlformats.org/drawingml/2006/compatibility" xmlns:p14="http://schemas.microsoft.com/office/powerpoint/2010/main" xmlns:p15="http://schemas.microsoft.com/office/powerpoint/2012/main">
+  <p:cSld>
+    <p:spTree>
+      <p:nvGrpSpPr>
+        <p:cNvPr id="138" name="Shape 138"/>
+        <p:cNvGrpSpPr/>
+        <p:nvPr/>
+      </p:nvGrpSpPr>
+      <p:grpSpPr>
+        <a:xfrm>
+          <a:off x="0" y="0"/>
+          <a:ext cx="0" cy="0"/>
+          <a:chOff x="0" y="0"/>
+          <a:chExt cx="0" cy="0"/>
+        </a:xfrm>
+      </p:grpSpPr>
+      <p:sp>
+        <p:nvSpPr>
+          <p:cNvPr id="139" name="Google Shape;139;p21"/>
+          <p:cNvSpPr txBox="1"/>
+          <p:nvPr>
+            <p:ph type="title"/>
+          </p:nvPr>
+        </p:nvSpPr>
+        <p:spPr>
+          <a:xfrm>
             <a:off x="577050" y="1166250"/>
             <a:ext cx="7688700" cy="535200"/>
           </a:xfrm>
@@ -11613,7 +12097,7 @@
       </p:sp>
       <p:pic>
         <p:nvPicPr>
-          <p:cNvPr id="134" name="Google Shape;134;p20"/>
+          <p:cNvPr id="140" name="Google Shape;140;p21"/>
           <p:cNvPicPr preferRelativeResize="0"/>
           <p:nvPr/>
         </p:nvPicPr>
@@ -11641,7 +12125,7 @@
       </p:pic>
       <p:pic>
         <p:nvPicPr>
-          <p:cNvPr id="135" name="Google Shape;135;p20"/>
+          <p:cNvPr id="141" name="Google Shape;141;p21"/>
           <p:cNvPicPr preferRelativeResize="0"/>
           <p:nvPr/>
         </p:nvPicPr>
@@ -11669,7 +12153,7 @@
       </p:pic>
       <p:pic>
         <p:nvPicPr>
-          <p:cNvPr id="136" name="Google Shape;136;p20"/>
+          <p:cNvPr id="142" name="Google Shape;142;p21"/>
           <p:cNvPicPr preferRelativeResize="0"/>
           <p:nvPr/>
         </p:nvPicPr>
@@ -11703,171 +12187,286 @@
 </p:sld>
 </file>
 
-<file path=ppt/slides/slide9.xml><?xml version="1.0" encoding="utf-8"?>
-<p:sld xmlns:a="http://schemas.openxmlformats.org/drawingml/2006/main" xmlns:r="http://schemas.openxmlformats.org/officeDocument/2006/relationships" xmlns:mc="http://schemas.openxmlformats.org/markup-compatibility/2006" xmlns:mv="urn:schemas-microsoft-com:mac:vml" xmlns:p="http://schemas.openxmlformats.org/presentationml/2006/main" xmlns:c="http://schemas.openxmlformats.org/drawingml/2006/chart" xmlns:dgm="http://schemas.openxmlformats.org/drawingml/2006/diagram" xmlns:o="urn:schemas-microsoft-com:office:office" xmlns:v="urn:schemas-microsoft-com:vml" xmlns:pvml="urn:schemas-microsoft-com:office:powerpoint" xmlns:com="http://schemas.openxmlformats.org/drawingml/2006/compatibility" xmlns:p14="http://schemas.microsoft.com/office/powerpoint/2010/main" xmlns:p15="http://schemas.microsoft.com/office/powerpoint/2012/main">
-  <p:cSld>
-    <p:spTree>
-      <p:nvGrpSpPr>
-        <p:cNvPr id="140" name="Shape 140"/>
-        <p:cNvGrpSpPr/>
-        <p:nvPr/>
-      </p:nvGrpSpPr>
-      <p:grpSpPr>
-        <a:xfrm>
-          <a:off x="0" y="0"/>
-          <a:ext cx="0" cy="0"/>
-          <a:chOff x="0" y="0"/>
-          <a:chExt cx="0" cy="0"/>
-        </a:xfrm>
-      </p:grpSpPr>
-      <p:sp>
-        <p:nvSpPr>
-          <p:cNvPr id="141" name="Google Shape;141;p21"/>
-          <p:cNvSpPr txBox="1"/>
-          <p:nvPr>
-            <p:ph type="title"/>
-          </p:nvPr>
-        </p:nvSpPr>
-        <p:spPr>
-          <a:xfrm>
-            <a:off x="653250" y="1166250"/>
-            <a:ext cx="7688700" cy="535200"/>
-          </a:xfrm>
-          <a:prstGeom prst="rect">
-            <a:avLst/>
-          </a:prstGeom>
-        </p:spPr>
-        <p:txBody>
-          <a:bodyPr anchorCtr="0" anchor="t" bIns="91425" lIns="91425" spcFirstLastPara="1" rIns="91425" wrap="square" tIns="91425">
-            <a:noAutofit/>
-          </a:bodyPr>
-          <a:lstStyle/>
-          <a:p>
-            <a:pPr indent="0" lvl="0" marL="0" rtl="0" algn="l">
-              <a:spcBef>
-                <a:spcPts val="0"/>
-              </a:spcBef>
-              <a:spcAft>
-                <a:spcPts val="0"/>
-              </a:spcAft>
-              <a:buNone/>
-            </a:pPr>
-            <a:r>
-              <a:rPr lang="en"/>
-              <a:t>Sonarqube</a:t>
-            </a:r>
-            <a:endParaRPr/>
-          </a:p>
-          <a:p>
-            <a:pPr indent="0" lvl="0" marL="0" rtl="0" algn="l">
-              <a:spcBef>
-                <a:spcPts val="0"/>
-              </a:spcBef>
-              <a:spcAft>
-                <a:spcPts val="0"/>
-              </a:spcAft>
-              <a:buNone/>
-            </a:pPr>
-            <a:r>
-              <a:t/>
-            </a:r>
-            <a:endParaRPr/>
-          </a:p>
-        </p:txBody>
-      </p:sp>
-      <p:pic>
-        <p:nvPicPr>
-          <p:cNvPr id="142" name="Google Shape;142;p21"/>
-          <p:cNvPicPr preferRelativeResize="0"/>
-          <p:nvPr/>
-        </p:nvPicPr>
-        <p:blipFill>
-          <a:blip r:embed="rId3">
-            <a:alphaModFix/>
-          </a:blip>
-          <a:stretch>
-            <a:fillRect/>
-          </a:stretch>
-        </p:blipFill>
-        <p:spPr>
-          <a:xfrm>
-            <a:off x="609600" y="1777650"/>
-            <a:ext cx="4303028" cy="3137249"/>
-          </a:xfrm>
-          <a:prstGeom prst="rect">
-            <a:avLst/>
-          </a:prstGeom>
-          <a:noFill/>
-          <a:ln>
-            <a:noFill/>
-          </a:ln>
-        </p:spPr>
-      </p:pic>
-      <p:pic>
-        <p:nvPicPr>
-          <p:cNvPr id="143" name="Google Shape;143;p21"/>
-          <p:cNvPicPr preferRelativeResize="0"/>
-          <p:nvPr/>
-        </p:nvPicPr>
-        <p:blipFill>
-          <a:blip r:embed="rId4">
-            <a:alphaModFix/>
-          </a:blip>
-          <a:stretch>
-            <a:fillRect/>
-          </a:stretch>
-        </p:blipFill>
-        <p:spPr>
-          <a:xfrm>
-            <a:off x="5333850" y="785250"/>
-            <a:ext cx="2483064" cy="2112999"/>
-          </a:xfrm>
-          <a:prstGeom prst="rect">
-            <a:avLst/>
-          </a:prstGeom>
-          <a:noFill/>
-          <a:ln>
-            <a:noFill/>
-          </a:ln>
-        </p:spPr>
-      </p:pic>
-      <p:pic>
-        <p:nvPicPr>
-          <p:cNvPr id="144" name="Google Shape;144;p21"/>
-          <p:cNvPicPr preferRelativeResize="0"/>
-          <p:nvPr/>
-        </p:nvPicPr>
-        <p:blipFill>
-          <a:blip r:embed="rId5">
-            <a:alphaModFix/>
-          </a:blip>
-          <a:stretch>
-            <a:fillRect/>
-          </a:stretch>
-        </p:blipFill>
-        <p:spPr>
-          <a:xfrm>
-            <a:off x="5388751" y="2905501"/>
-            <a:ext cx="2483075" cy="2126649"/>
-          </a:xfrm>
-          <a:prstGeom prst="rect">
-            <a:avLst/>
-          </a:prstGeom>
-          <a:noFill/>
-          <a:ln>
-            <a:noFill/>
-          </a:ln>
-        </p:spPr>
-      </p:pic>
-    </p:spTree>
-  </p:cSld>
-  <p:clrMapOvr>
-    <a:masterClrMapping/>
-  </p:clrMapOvr>
-</p:sld>
+<file path=ppt/theme/theme1.xml><?xml version="1.0" encoding="utf-8"?>
+<a:theme xmlns:a="http://schemas.openxmlformats.org/drawingml/2006/main" xmlns:r="http://schemas.openxmlformats.org/officeDocument/2006/relationships">
+  <a:themeElements>
+    <a:clrScheme name="Default">
+      <a:dk1>
+        <a:srgbClr val="000000"/>
+      </a:dk1>
+      <a:lt1>
+        <a:srgbClr val="FFFFFF"/>
+      </a:lt1>
+      <a:dk2>
+        <a:srgbClr val="158158"/>
+      </a:dk2>
+      <a:lt2>
+        <a:srgbClr val="F3F3F3"/>
+      </a:lt2>
+      <a:accent1>
+        <a:srgbClr val="058DC7"/>
+      </a:accent1>
+      <a:accent2>
+        <a:srgbClr val="50B432"/>
+      </a:accent2>
+      <a:accent3>
+        <a:srgbClr val="ED561B"/>
+      </a:accent3>
+      <a:accent4>
+        <a:srgbClr val="EDEF00"/>
+      </a:accent4>
+      <a:accent5>
+        <a:srgbClr val="24CBE5"/>
+      </a:accent5>
+      <a:accent6>
+        <a:srgbClr val="64E572"/>
+      </a:accent6>
+      <a:hlink>
+        <a:srgbClr val="2200CC"/>
+      </a:hlink>
+      <a:folHlink>
+        <a:srgbClr val="551A8B"/>
+      </a:folHlink>
+    </a:clrScheme>
+    <a:fontScheme name="Office">
+      <a:majorFont>
+        <a:latin typeface="Arial"/>
+        <a:ea typeface=""/>
+        <a:cs typeface=""/>
+        <a:font script="Jpan" typeface="ＭＳ Ｐゴシック"/>
+        <a:font script="Hang" typeface="맑은 고딕"/>
+        <a:font script="Hans" typeface="宋体"/>
+        <a:font script="Hant" typeface="新細明體"/>
+        <a:font script="Arab" typeface="Times New Roman"/>
+        <a:font script="Hebr" typeface="Times New Roman"/>
+        <a:font script="Thai" typeface="Angsana New"/>
+        <a:font script="Ethi" typeface="Nyala"/>
+        <a:font script="Beng" typeface="Vrinda"/>
+        <a:font script="Gujr" typeface="Shruti"/>
+        <a:font script="Khmr" typeface="MoolBoran"/>
+        <a:font script="Knda" typeface="Tunga"/>
+        <a:font script="Guru" typeface="Raavi"/>
+        <a:font script="Cans" typeface="Euphemia"/>
+        <a:font script="Cher" typeface="Plantagenet Cherokee"/>
+        <a:font script="Yiii" typeface="Microsoft Yi Baiti"/>
+        <a:font script="Tibt" typeface="Microsoft Himalaya"/>
+        <a:font script="Thaa" typeface="MV Boli"/>
+        <a:font script="Deva" typeface="Mangal"/>
+        <a:font script="Telu" typeface="Gautami"/>
+        <a:font script="Taml" typeface="Latha"/>
+        <a:font script="Syrc" typeface="Estrangelo Edessa"/>
+        <a:font script="Orya" typeface="Kalinga"/>
+        <a:font script="Mlym" typeface="Kartika"/>
+        <a:font script="Laoo" typeface="DokChampa"/>
+        <a:font script="Sinh" typeface="Iskoola Pota"/>
+        <a:font script="Mong" typeface="Mongolian Baiti"/>
+        <a:font script="Viet" typeface="Times New Roman"/>
+        <a:font script="Uigh" typeface="Microsoft Uighur"/>
+        <a:font script="Geor" typeface="Sylfaen"/>
+      </a:majorFont>
+      <a:minorFont>
+        <a:latin typeface="Arial"/>
+        <a:ea typeface=""/>
+        <a:cs typeface=""/>
+        <a:font script="Jpan" typeface="ＭＳ Ｐゴシック"/>
+        <a:font script="Hang" typeface="맑은 고딕"/>
+        <a:font script="Hans" typeface="宋体"/>
+        <a:font script="Hant" typeface="新細明體"/>
+        <a:font script="Arab" typeface="Arial"/>
+        <a:font script="Hebr" typeface="Arial"/>
+        <a:font script="Thai" typeface="Cordia New"/>
+        <a:font script="Ethi" typeface="Nyala"/>
+        <a:font script="Beng" typeface="Vrinda"/>
+        <a:font script="Gujr" typeface="Shruti"/>
+        <a:font script="Khmr" typeface="DaunPenh"/>
+        <a:font script="Knda" typeface="Tunga"/>
+        <a:font script="Guru" typeface="Raavi"/>
+        <a:font script="Cans" typeface="Euphemia"/>
+        <a:font script="Cher" typeface="Plantagenet Cherokee"/>
+        <a:font script="Yiii" typeface="Microsoft Yi Baiti"/>
+        <a:font script="Tibt" typeface="Microsoft Himalaya"/>
+        <a:font script="Thaa" typeface="MV Boli"/>
+        <a:font script="Deva" typeface="Mangal"/>
+        <a:font script="Telu" typeface="Gautami"/>
+        <a:font script="Taml" typeface="Latha"/>
+        <a:font script="Syrc" typeface="Estrangelo Edessa"/>
+        <a:font script="Orya" typeface="Kalinga"/>
+        <a:font script="Mlym" typeface="Kartika"/>
+        <a:font script="Laoo" typeface="DokChampa"/>
+        <a:font script="Sinh" typeface="Iskoola Pota"/>
+        <a:font script="Mong" typeface="Mongolian Baiti"/>
+        <a:font script="Viet" typeface="Arial"/>
+        <a:font script="Uigh" typeface="Microsoft Uighur"/>
+        <a:font script="Geor" typeface="Sylfaen"/>
+      </a:minorFont>
+    </a:fontScheme>
+    <a:fmtScheme name="Office">
+      <a:fillStyleLst>
+        <a:solidFill>
+          <a:schemeClr val="phClr"/>
+        </a:solidFill>
+        <a:gradFill rotWithShape="1">
+          <a:gsLst>
+            <a:gs pos="0">
+              <a:schemeClr val="phClr">
+                <a:tint val="50000"/>
+                <a:satMod val="300000"/>
+              </a:schemeClr>
+            </a:gs>
+            <a:gs pos="35000">
+              <a:schemeClr val="phClr">
+                <a:tint val="37000"/>
+                <a:satMod val="300000"/>
+              </a:schemeClr>
+            </a:gs>
+            <a:gs pos="100000">
+              <a:schemeClr val="phClr">
+                <a:tint val="15000"/>
+                <a:satMod val="350000"/>
+              </a:schemeClr>
+            </a:gs>
+          </a:gsLst>
+          <a:lin ang="16200000" scaled="1"/>
+        </a:gradFill>
+        <a:gradFill rotWithShape="1">
+          <a:gsLst>
+            <a:gs pos="0">
+              <a:schemeClr val="phClr">
+                <a:tint val="100000"/>
+                <a:shade val="100000"/>
+                <a:satMod val="130000"/>
+              </a:schemeClr>
+            </a:gs>
+            <a:gs pos="100000">
+              <a:schemeClr val="phClr">
+                <a:tint val="50000"/>
+                <a:shade val="100000"/>
+                <a:satMod val="350000"/>
+              </a:schemeClr>
+            </a:gs>
+          </a:gsLst>
+          <a:lin ang="16200000" scaled="0"/>
+        </a:gradFill>
+      </a:fillStyleLst>
+      <a:lnStyleLst>
+        <a:ln w="9525" cap="flat" cmpd="sng" algn="ctr">
+          <a:solidFill>
+            <a:schemeClr val="phClr">
+              <a:shade val="95000"/>
+              <a:satMod val="105000"/>
+            </a:schemeClr>
+          </a:solidFill>
+          <a:prstDash val="solid"/>
+        </a:ln>
+        <a:ln w="25400" cap="flat" cmpd="sng" algn="ctr">
+          <a:solidFill>
+            <a:schemeClr val="phClr"/>
+          </a:solidFill>
+          <a:prstDash val="solid"/>
+        </a:ln>
+        <a:ln w="38100" cap="flat" cmpd="sng" algn="ctr">
+          <a:solidFill>
+            <a:schemeClr val="phClr"/>
+          </a:solidFill>
+          <a:prstDash val="solid"/>
+        </a:ln>
+      </a:lnStyleLst>
+      <a:effectStyleLst>
+        <a:effectStyle>
+          <a:effectLst>
+            <a:outerShdw blurRad="40000" dist="20000" dir="5400000" rotWithShape="0">
+              <a:srgbClr val="000000">
+                <a:alpha val="38000"/>
+              </a:srgbClr>
+            </a:outerShdw>
+          </a:effectLst>
+        </a:effectStyle>
+        <a:effectStyle>
+          <a:effectLst>
+            <a:outerShdw blurRad="40000" dist="23000" dir="5400000" rotWithShape="0">
+              <a:srgbClr val="000000">
+                <a:alpha val="35000"/>
+              </a:srgbClr>
+            </a:outerShdw>
+          </a:effectLst>
+        </a:effectStyle>
+        <a:effectStyle>
+          <a:effectLst>
+            <a:outerShdw blurRad="40000" dist="23000" dir="5400000" rotWithShape="0">
+              <a:srgbClr val="000000">
+                <a:alpha val="35000"/>
+              </a:srgbClr>
+            </a:outerShdw>
+          </a:effectLst>
+          <a:scene3d>
+            <a:camera prst="orthographicFront">
+              <a:rot lat="0" lon="0" rev="0"/>
+            </a:camera>
+            <a:lightRig rig="threePt" dir="t">
+              <a:rot lat="0" lon="0" rev="1200000"/>
+            </a:lightRig>
+          </a:scene3d>
+          <a:sp3d>
+            <a:bevelT w="63500" h="25400"/>
+          </a:sp3d>
+        </a:effectStyle>
+      </a:effectStyleLst>
+      <a:bgFillStyleLst>
+        <a:solidFill>
+          <a:schemeClr val="phClr"/>
+        </a:solidFill>
+        <a:gradFill rotWithShape="1">
+          <a:gsLst>
+            <a:gs pos="0">
+              <a:schemeClr val="phClr">
+                <a:tint val="40000"/>
+                <a:satMod val="350000"/>
+              </a:schemeClr>
+            </a:gs>
+            <a:gs pos="40000">
+              <a:schemeClr val="phClr">
+                <a:tint val="45000"/>
+                <a:shade val="99000"/>
+                <a:satMod val="350000"/>
+              </a:schemeClr>
+            </a:gs>
+            <a:gs pos="100000">
+              <a:schemeClr val="phClr">
+                <a:shade val="20000"/>
+                <a:satMod val="255000"/>
+              </a:schemeClr>
+            </a:gs>
+          </a:gsLst>
+          <a:path path="circle">
+            <a:fillToRect l="50000" t="-80000" r="50000" b="180000"/>
+          </a:path>
+        </a:gradFill>
+        <a:gradFill rotWithShape="1">
+          <a:gsLst>
+            <a:gs pos="0">
+              <a:schemeClr val="phClr">
+                <a:tint val="80000"/>
+                <a:satMod val="300000"/>
+              </a:schemeClr>
+            </a:gs>
+            <a:gs pos="100000">
+              <a:schemeClr val="phClr">
+                <a:shade val="30000"/>
+                <a:satMod val="200000"/>
+              </a:schemeClr>
+            </a:gs>
+          </a:gsLst>
+          <a:path path="circle">
+            <a:fillToRect l="50000" t="50000" r="50000" b="50000"/>
+          </a:path>
+        </a:gradFill>
+      </a:bgFillStyleLst>
+    </a:fmtScheme>
+  </a:themeElements>
+</a:theme>
 </file>
 
-<file path=ppt/theme/theme1.xml><?xml version="1.0" encoding="utf-8"?>
+<file path=ppt/theme/theme2.xml><?xml version="1.0" encoding="utf-8"?>
 <a:theme xmlns:a="http://schemas.openxmlformats.org/drawingml/2006/main" xmlns:r="http://schemas.openxmlformats.org/officeDocument/2006/relationships" name="Streamline">
   <a:themeElements>
     <a:clrScheme name="Streamline">
@@ -12144,283 +12743,4 @@
     </a:fmtScheme>
   </a:themeElements>
 </a:theme>
-</file>
-
-<file path=ppt/theme/theme2.xml><?xml version="1.0" encoding="utf-8"?>
-<a:theme xmlns:a="http://schemas.openxmlformats.org/drawingml/2006/main" xmlns:r="http://schemas.openxmlformats.org/officeDocument/2006/relationships">
-  <a:themeElements>
-    <a:clrScheme name="Default">
-      <a:dk1>
-        <a:srgbClr val="000000"/>
-      </a:dk1>
-      <a:lt1>
-        <a:srgbClr val="FFFFFF"/>
-      </a:lt1>
-      <a:dk2>
-        <a:srgbClr val="158158"/>
-      </a:dk2>
-      <a:lt2>
-        <a:srgbClr val="F3F3F3"/>
-      </a:lt2>
-      <a:accent1>
-        <a:srgbClr val="058DC7"/>
-      </a:accent1>
-      <a:accent2>
-        <a:srgbClr val="50B432"/>
-      </a:accent2>
-      <a:accent3>
-        <a:srgbClr val="ED561B"/>
-      </a:accent3>
-      <a:accent4>
-        <a:srgbClr val="EDEF00"/>
-      </a:accent4>
-      <a:accent5>
-        <a:srgbClr val="24CBE5"/>
-      </a:accent5>
-      <a:accent6>
-        <a:srgbClr val="64E572"/>
-      </a:accent6>
-      <a:hlink>
-        <a:srgbClr val="2200CC"/>
-      </a:hlink>
-      <a:folHlink>
-        <a:srgbClr val="551A8B"/>
-      </a:folHlink>
-    </a:clrScheme>
-    <a:fontScheme name="Office">
-      <a:majorFont>
-        <a:latin typeface="Arial"/>
-        <a:ea typeface=""/>
-        <a:cs typeface=""/>
-        <a:font script="Jpan" typeface="ＭＳ Ｐゴシック"/>
-        <a:font script="Hang" typeface="맑은 고딕"/>
-        <a:font script="Hans" typeface="宋体"/>
-        <a:font script="Hant" typeface="新細明體"/>
-        <a:font script="Arab" typeface="Times New Roman"/>
-        <a:font script="Hebr" typeface="Times New Roman"/>
-        <a:font script="Thai" typeface="Angsana New"/>
-        <a:font script="Ethi" typeface="Nyala"/>
-        <a:font script="Beng" typeface="Vrinda"/>
-        <a:font script="Gujr" typeface="Shruti"/>
-        <a:font script="Khmr" typeface="MoolBoran"/>
-        <a:font script="Knda" typeface="Tunga"/>
-        <a:font script="Guru" typeface="Raavi"/>
-        <a:font script="Cans" typeface="Euphemia"/>
-        <a:font script="Cher" typeface="Plantagenet Cherokee"/>
-        <a:font script="Yiii" typeface="Microsoft Yi Baiti"/>
-        <a:font script="Tibt" typeface="Microsoft Himalaya"/>
-        <a:font script="Thaa" typeface="MV Boli"/>
-        <a:font script="Deva" typeface="Mangal"/>
-        <a:font script="Telu" typeface="Gautami"/>
-        <a:font script="Taml" typeface="Latha"/>
-        <a:font script="Syrc" typeface="Estrangelo Edessa"/>
-        <a:font script="Orya" typeface="Kalinga"/>
-        <a:font script="Mlym" typeface="Kartika"/>
-        <a:font script="Laoo" typeface="DokChampa"/>
-        <a:font script="Sinh" typeface="Iskoola Pota"/>
-        <a:font script="Mong" typeface="Mongolian Baiti"/>
-        <a:font script="Viet" typeface="Times New Roman"/>
-        <a:font script="Uigh" typeface="Microsoft Uighur"/>
-        <a:font script="Geor" typeface="Sylfaen"/>
-      </a:majorFont>
-      <a:minorFont>
-        <a:latin typeface="Arial"/>
-        <a:ea typeface=""/>
-        <a:cs typeface=""/>
-        <a:font script="Jpan" typeface="ＭＳ Ｐゴシック"/>
-        <a:font script="Hang" typeface="맑은 고딕"/>
-        <a:font script="Hans" typeface="宋体"/>
-        <a:font script="Hant" typeface="新細明體"/>
-        <a:font script="Arab" typeface="Arial"/>
-        <a:font script="Hebr" typeface="Arial"/>
-        <a:font script="Thai" typeface="Cordia New"/>
-        <a:font script="Ethi" typeface="Nyala"/>
-        <a:font script="Beng" typeface="Vrinda"/>
-        <a:font script="Gujr" typeface="Shruti"/>
-        <a:font script="Khmr" typeface="DaunPenh"/>
-        <a:font script="Knda" typeface="Tunga"/>
-        <a:font script="Guru" typeface="Raavi"/>
-        <a:font script="Cans" typeface="Euphemia"/>
-        <a:font script="Cher" typeface="Plantagenet Cherokee"/>
-        <a:font script="Yiii" typeface="Microsoft Yi Baiti"/>
-        <a:font script="Tibt" typeface="Microsoft Himalaya"/>
-        <a:font script="Thaa" typeface="MV Boli"/>
-        <a:font script="Deva" typeface="Mangal"/>
-        <a:font script="Telu" typeface="Gautami"/>
-        <a:font script="Taml" typeface="Latha"/>
-        <a:font script="Syrc" typeface="Estrangelo Edessa"/>
-        <a:font script="Orya" typeface="Kalinga"/>
-        <a:font script="Mlym" typeface="Kartika"/>
-        <a:font script="Laoo" typeface="DokChampa"/>
-        <a:font script="Sinh" typeface="Iskoola Pota"/>
-        <a:font script="Mong" typeface="Mongolian Baiti"/>
-        <a:font script="Viet" typeface="Arial"/>
-        <a:font script="Uigh" typeface="Microsoft Uighur"/>
-        <a:font script="Geor" typeface="Sylfaen"/>
-      </a:minorFont>
-    </a:fontScheme>
-    <a:fmtScheme name="Office">
-      <a:fillStyleLst>
-        <a:solidFill>
-          <a:schemeClr val="phClr"/>
-        </a:solidFill>
-        <a:gradFill rotWithShape="1">
-          <a:gsLst>
-            <a:gs pos="0">
-              <a:schemeClr val="phClr">
-                <a:tint val="50000"/>
-                <a:satMod val="300000"/>
-              </a:schemeClr>
-            </a:gs>
-            <a:gs pos="35000">
-              <a:schemeClr val="phClr">
-                <a:tint val="37000"/>
-                <a:satMod val="300000"/>
-              </a:schemeClr>
-            </a:gs>
-            <a:gs pos="100000">
-              <a:schemeClr val="phClr">
-                <a:tint val="15000"/>
-                <a:satMod val="350000"/>
-              </a:schemeClr>
-            </a:gs>
-          </a:gsLst>
-          <a:lin ang="16200000" scaled="1"/>
-        </a:gradFill>
-        <a:gradFill rotWithShape="1">
-          <a:gsLst>
-            <a:gs pos="0">
-              <a:schemeClr val="phClr">
-                <a:tint val="100000"/>
-                <a:shade val="100000"/>
-                <a:satMod val="130000"/>
-              </a:schemeClr>
-            </a:gs>
-            <a:gs pos="100000">
-              <a:schemeClr val="phClr">
-                <a:tint val="50000"/>
-                <a:shade val="100000"/>
-                <a:satMod val="350000"/>
-              </a:schemeClr>
-            </a:gs>
-          </a:gsLst>
-          <a:lin ang="16200000" scaled="0"/>
-        </a:gradFill>
-      </a:fillStyleLst>
-      <a:lnStyleLst>
-        <a:ln w="9525" cap="flat" cmpd="sng" algn="ctr">
-          <a:solidFill>
-            <a:schemeClr val="phClr">
-              <a:shade val="95000"/>
-              <a:satMod val="105000"/>
-            </a:schemeClr>
-          </a:solidFill>
-          <a:prstDash val="solid"/>
-        </a:ln>
-        <a:ln w="25400" cap="flat" cmpd="sng" algn="ctr">
-          <a:solidFill>
-            <a:schemeClr val="phClr"/>
-          </a:solidFill>
-          <a:prstDash val="solid"/>
-        </a:ln>
-        <a:ln w="38100" cap="flat" cmpd="sng" algn="ctr">
-          <a:solidFill>
-            <a:schemeClr val="phClr"/>
-          </a:solidFill>
-          <a:prstDash val="solid"/>
-        </a:ln>
-      </a:lnStyleLst>
-      <a:effectStyleLst>
-        <a:effectStyle>
-          <a:effectLst>
-            <a:outerShdw blurRad="40000" dist="20000" dir="5400000" rotWithShape="0">
-              <a:srgbClr val="000000">
-                <a:alpha val="38000"/>
-              </a:srgbClr>
-            </a:outerShdw>
-          </a:effectLst>
-        </a:effectStyle>
-        <a:effectStyle>
-          <a:effectLst>
-            <a:outerShdw blurRad="40000" dist="23000" dir="5400000" rotWithShape="0">
-              <a:srgbClr val="000000">
-                <a:alpha val="35000"/>
-              </a:srgbClr>
-            </a:outerShdw>
-          </a:effectLst>
-        </a:effectStyle>
-        <a:effectStyle>
-          <a:effectLst>
-            <a:outerShdw blurRad="40000" dist="23000" dir="5400000" rotWithShape="0">
-              <a:srgbClr val="000000">
-                <a:alpha val="35000"/>
-              </a:srgbClr>
-            </a:outerShdw>
-          </a:effectLst>
-          <a:scene3d>
-            <a:camera prst="orthographicFront">
-              <a:rot lat="0" lon="0" rev="0"/>
-            </a:camera>
-            <a:lightRig rig="threePt" dir="t">
-              <a:rot lat="0" lon="0" rev="1200000"/>
-            </a:lightRig>
-          </a:scene3d>
-          <a:sp3d>
-            <a:bevelT w="63500" h="25400"/>
-          </a:sp3d>
-        </a:effectStyle>
-      </a:effectStyleLst>
-      <a:bgFillStyleLst>
-        <a:solidFill>
-          <a:schemeClr val="phClr"/>
-        </a:solidFill>
-        <a:gradFill rotWithShape="1">
-          <a:gsLst>
-            <a:gs pos="0">
-              <a:schemeClr val="phClr">
-                <a:tint val="40000"/>
-                <a:satMod val="350000"/>
-              </a:schemeClr>
-            </a:gs>
-            <a:gs pos="40000">
-              <a:schemeClr val="phClr">
-                <a:tint val="45000"/>
-                <a:shade val="99000"/>
-                <a:satMod val="350000"/>
-              </a:schemeClr>
-            </a:gs>
-            <a:gs pos="100000">
-              <a:schemeClr val="phClr">
-                <a:shade val="20000"/>
-                <a:satMod val="255000"/>
-              </a:schemeClr>
-            </a:gs>
-          </a:gsLst>
-          <a:path path="circle">
-            <a:fillToRect l="50000" t="-80000" r="50000" b="180000"/>
-          </a:path>
-        </a:gradFill>
-        <a:gradFill rotWithShape="1">
-          <a:gsLst>
-            <a:gs pos="0">
-              <a:schemeClr val="phClr">
-                <a:tint val="80000"/>
-                <a:satMod val="300000"/>
-              </a:schemeClr>
-            </a:gs>
-            <a:gs pos="100000">
-              <a:schemeClr val="phClr">
-                <a:shade val="30000"/>
-                <a:satMod val="200000"/>
-              </a:schemeClr>
-            </a:gs>
-          </a:gsLst>
-          <a:path path="circle">
-            <a:fillToRect l="50000" t="50000" r="50000" b="50000"/>
-          </a:path>
-        </a:gradFill>
-      </a:bgFillStyleLst>
-    </a:fmtScheme>
-  </a:themeElements>
-</a:theme>
 </file>
</xml_diff>